<commit_message>
*Updated Capstone Final Project Documents
Updated Capstone Final Project Documents - Code, Presentation and Report
</commit_message>
<xml_diff>
--- a/Capstone_Final_Report_Cybersecurity.pptx
+++ b/Capstone_Final_Report_Cybersecurity.pptx
@@ -5,7 +5,7 @@
     <p:sldMasterId id="2147483840" r:id="rId1"/>
   </p:sldMasterIdLst>
   <p:notesMasterIdLst>
-    <p:notesMasterId r:id="rId40"/>
+    <p:notesMasterId r:id="rId30"/>
   </p:notesMasterIdLst>
   <p:sldIdLst>
     <p:sldId id="256" r:id="rId2"/>
@@ -19,33 +19,23 @@
     <p:sldId id="265" r:id="rId10"/>
     <p:sldId id="297" r:id="rId11"/>
     <p:sldId id="266" r:id="rId12"/>
-    <p:sldId id="274" r:id="rId13"/>
-    <p:sldId id="275" r:id="rId14"/>
-    <p:sldId id="276" r:id="rId15"/>
-    <p:sldId id="267" r:id="rId16"/>
-    <p:sldId id="277" r:id="rId17"/>
-    <p:sldId id="278" r:id="rId18"/>
-    <p:sldId id="279" r:id="rId19"/>
-    <p:sldId id="280" r:id="rId20"/>
-    <p:sldId id="281" r:id="rId21"/>
-    <p:sldId id="282" r:id="rId22"/>
-    <p:sldId id="283" r:id="rId23"/>
-    <p:sldId id="284" r:id="rId24"/>
-    <p:sldId id="285" r:id="rId25"/>
-    <p:sldId id="286" r:id="rId26"/>
-    <p:sldId id="287" r:id="rId27"/>
-    <p:sldId id="288" r:id="rId28"/>
-    <p:sldId id="268" r:id="rId29"/>
-    <p:sldId id="289" r:id="rId30"/>
-    <p:sldId id="290" r:id="rId31"/>
-    <p:sldId id="291" r:id="rId32"/>
-    <p:sldId id="292" r:id="rId33"/>
-    <p:sldId id="293" r:id="rId34"/>
-    <p:sldId id="294" r:id="rId35"/>
-    <p:sldId id="295" r:id="rId36"/>
-    <p:sldId id="296" r:id="rId37"/>
-    <p:sldId id="269" r:id="rId38"/>
-    <p:sldId id="271" r:id="rId39"/>
+    <p:sldId id="267" r:id="rId13"/>
+    <p:sldId id="277" r:id="rId14"/>
+    <p:sldId id="278" r:id="rId15"/>
+    <p:sldId id="279" r:id="rId16"/>
+    <p:sldId id="280" r:id="rId17"/>
+    <p:sldId id="281" r:id="rId18"/>
+    <p:sldId id="282" r:id="rId19"/>
+    <p:sldId id="283" r:id="rId20"/>
+    <p:sldId id="284" r:id="rId21"/>
+    <p:sldId id="285" r:id="rId22"/>
+    <p:sldId id="286" r:id="rId23"/>
+    <p:sldId id="287" r:id="rId24"/>
+    <p:sldId id="288" r:id="rId25"/>
+    <p:sldId id="268" r:id="rId26"/>
+    <p:sldId id="289" r:id="rId27"/>
+    <p:sldId id="269" r:id="rId28"/>
+    <p:sldId id="271" r:id="rId29"/>
   </p:sldIdLst>
   <p:sldSz cx="12192000" cy="6858000"/>
   <p:notesSz cx="6858000" cy="9144000"/>
@@ -273,7 +263,7 @@
           <a:p>
             <a:fld id="{7DE2D13B-CE0D-4742-A10E-E75DA0C257B1}" type="datetimeFigureOut">
               <a:rPr lang="en-US" smtClean="0"/>
-              <a:t>6/8/17</a:t>
+              <a:t>6/15/17</a:t>
             </a:fld>
             <a:endParaRPr lang="en-US"/>
           </a:p>
@@ -541,426 +531,6 @@
 </p:notesMaster>
 </file>
 
-<file path=ppt/notesSlides/notesSlide1.xml><?xml version="1.0" encoding="utf-8"?>
-<p:notes xmlns:a="http://schemas.openxmlformats.org/drawingml/2006/main" xmlns:r="http://schemas.openxmlformats.org/officeDocument/2006/relationships" xmlns:p="http://schemas.openxmlformats.org/presentationml/2006/main">
-  <p:cSld>
-    <p:spTree>
-      <p:nvGrpSpPr>
-        <p:cNvPr id="1" name=""/>
-        <p:cNvGrpSpPr/>
-        <p:nvPr/>
-      </p:nvGrpSpPr>
-      <p:grpSpPr>
-        <a:xfrm>
-          <a:off x="0" y="0"/>
-          <a:ext cx="0" cy="0"/>
-          <a:chOff x="0" y="0"/>
-          <a:chExt cx="0" cy="0"/>
-        </a:xfrm>
-      </p:grpSpPr>
-      <p:sp>
-        <p:nvSpPr>
-          <p:cNvPr id="2" name="Slide Image Placeholder 1"/>
-          <p:cNvSpPr>
-            <a:spLocks noGrp="1" noRot="1" noChangeAspect="1"/>
-          </p:cNvSpPr>
-          <p:nvPr>
-            <p:ph type="sldImg"/>
-          </p:nvPr>
-        </p:nvSpPr>
-        <p:spPr/>
-      </p:sp>
-      <p:sp>
-        <p:nvSpPr>
-          <p:cNvPr id="3" name="Notes Placeholder 2"/>
-          <p:cNvSpPr>
-            <a:spLocks noGrp="1"/>
-          </p:cNvSpPr>
-          <p:nvPr>
-            <p:ph type="body" idx="1"/>
-          </p:nvPr>
-        </p:nvSpPr>
-        <p:spPr/>
-        <p:txBody>
-          <a:bodyPr/>
-          <a:lstStyle/>
-          <a:p>
-            <a:endParaRPr lang="en-US" dirty="0"/>
-          </a:p>
-        </p:txBody>
-      </p:sp>
-      <p:sp>
-        <p:nvSpPr>
-          <p:cNvPr id="4" name="Slide Number Placeholder 3"/>
-          <p:cNvSpPr>
-            <a:spLocks noGrp="1"/>
-          </p:cNvSpPr>
-          <p:nvPr>
-            <p:ph type="sldNum" sz="quarter" idx="10"/>
-          </p:nvPr>
-        </p:nvSpPr>
-        <p:spPr/>
-        <p:txBody>
-          <a:bodyPr/>
-          <a:lstStyle/>
-          <a:p>
-            <a:fld id="{0A6A02C2-54F5-2849-892A-FAF5B04F0FA3}" type="slidenum">
-              <a:rPr lang="en-US" smtClean="0"/>
-              <a:t>32</a:t>
-            </a:fld>
-            <a:endParaRPr lang="en-US"/>
-          </a:p>
-        </p:txBody>
-      </p:sp>
-    </p:spTree>
-    <p:extLst>
-      <p:ext uri="{BB962C8B-B14F-4D97-AF65-F5344CB8AC3E}">
-        <p14:creationId xmlns:p14="http://schemas.microsoft.com/office/powerpoint/2010/main" val="1763749032"/>
-      </p:ext>
-    </p:extLst>
-  </p:cSld>
-  <p:clrMapOvr>
-    <a:masterClrMapping/>
-  </p:clrMapOvr>
-</p:notes>
-</file>
-
-<file path=ppt/notesSlides/notesSlide2.xml><?xml version="1.0" encoding="utf-8"?>
-<p:notes xmlns:a="http://schemas.openxmlformats.org/drawingml/2006/main" xmlns:r="http://schemas.openxmlformats.org/officeDocument/2006/relationships" xmlns:p="http://schemas.openxmlformats.org/presentationml/2006/main">
-  <p:cSld>
-    <p:spTree>
-      <p:nvGrpSpPr>
-        <p:cNvPr id="1" name=""/>
-        <p:cNvGrpSpPr/>
-        <p:nvPr/>
-      </p:nvGrpSpPr>
-      <p:grpSpPr>
-        <a:xfrm>
-          <a:off x="0" y="0"/>
-          <a:ext cx="0" cy="0"/>
-          <a:chOff x="0" y="0"/>
-          <a:chExt cx="0" cy="0"/>
-        </a:xfrm>
-      </p:grpSpPr>
-      <p:sp>
-        <p:nvSpPr>
-          <p:cNvPr id="2" name="Slide Image Placeholder 1"/>
-          <p:cNvSpPr>
-            <a:spLocks noGrp="1" noRot="1" noChangeAspect="1"/>
-          </p:cNvSpPr>
-          <p:nvPr>
-            <p:ph type="sldImg"/>
-          </p:nvPr>
-        </p:nvSpPr>
-        <p:spPr/>
-      </p:sp>
-      <p:sp>
-        <p:nvSpPr>
-          <p:cNvPr id="3" name="Notes Placeholder 2"/>
-          <p:cNvSpPr>
-            <a:spLocks noGrp="1"/>
-          </p:cNvSpPr>
-          <p:nvPr>
-            <p:ph type="body" idx="1"/>
-          </p:nvPr>
-        </p:nvSpPr>
-        <p:spPr/>
-        <p:txBody>
-          <a:bodyPr/>
-          <a:lstStyle/>
-          <a:p>
-            <a:endParaRPr lang="en-US" dirty="0"/>
-          </a:p>
-        </p:txBody>
-      </p:sp>
-      <p:sp>
-        <p:nvSpPr>
-          <p:cNvPr id="4" name="Slide Number Placeholder 3"/>
-          <p:cNvSpPr>
-            <a:spLocks noGrp="1"/>
-          </p:cNvSpPr>
-          <p:nvPr>
-            <p:ph type="sldNum" sz="quarter" idx="10"/>
-          </p:nvPr>
-        </p:nvSpPr>
-        <p:spPr/>
-        <p:txBody>
-          <a:bodyPr/>
-          <a:lstStyle/>
-          <a:p>
-            <a:fld id="{0A6A02C2-54F5-2849-892A-FAF5B04F0FA3}" type="slidenum">
-              <a:rPr lang="en-US" smtClean="0"/>
-              <a:t>33</a:t>
-            </a:fld>
-            <a:endParaRPr lang="en-US"/>
-          </a:p>
-        </p:txBody>
-      </p:sp>
-    </p:spTree>
-    <p:extLst>
-      <p:ext uri="{BB962C8B-B14F-4D97-AF65-F5344CB8AC3E}">
-        <p14:creationId xmlns:p14="http://schemas.microsoft.com/office/powerpoint/2010/main" val="477386276"/>
-      </p:ext>
-    </p:extLst>
-  </p:cSld>
-  <p:clrMapOvr>
-    <a:masterClrMapping/>
-  </p:clrMapOvr>
-</p:notes>
-</file>
-
-<file path=ppt/notesSlides/notesSlide3.xml><?xml version="1.0" encoding="utf-8"?>
-<p:notes xmlns:a="http://schemas.openxmlformats.org/drawingml/2006/main" xmlns:r="http://schemas.openxmlformats.org/officeDocument/2006/relationships" xmlns:p="http://schemas.openxmlformats.org/presentationml/2006/main">
-  <p:cSld>
-    <p:spTree>
-      <p:nvGrpSpPr>
-        <p:cNvPr id="1" name=""/>
-        <p:cNvGrpSpPr/>
-        <p:nvPr/>
-      </p:nvGrpSpPr>
-      <p:grpSpPr>
-        <a:xfrm>
-          <a:off x="0" y="0"/>
-          <a:ext cx="0" cy="0"/>
-          <a:chOff x="0" y="0"/>
-          <a:chExt cx="0" cy="0"/>
-        </a:xfrm>
-      </p:grpSpPr>
-      <p:sp>
-        <p:nvSpPr>
-          <p:cNvPr id="2" name="Slide Image Placeholder 1"/>
-          <p:cNvSpPr>
-            <a:spLocks noGrp="1" noRot="1" noChangeAspect="1"/>
-          </p:cNvSpPr>
-          <p:nvPr>
-            <p:ph type="sldImg"/>
-          </p:nvPr>
-        </p:nvSpPr>
-        <p:spPr/>
-      </p:sp>
-      <p:sp>
-        <p:nvSpPr>
-          <p:cNvPr id="3" name="Notes Placeholder 2"/>
-          <p:cNvSpPr>
-            <a:spLocks noGrp="1"/>
-          </p:cNvSpPr>
-          <p:nvPr>
-            <p:ph type="body" idx="1"/>
-          </p:nvPr>
-        </p:nvSpPr>
-        <p:spPr/>
-        <p:txBody>
-          <a:bodyPr/>
-          <a:lstStyle/>
-          <a:p>
-            <a:endParaRPr lang="en-US" dirty="0"/>
-          </a:p>
-        </p:txBody>
-      </p:sp>
-      <p:sp>
-        <p:nvSpPr>
-          <p:cNvPr id="4" name="Slide Number Placeholder 3"/>
-          <p:cNvSpPr>
-            <a:spLocks noGrp="1"/>
-          </p:cNvSpPr>
-          <p:nvPr>
-            <p:ph type="sldNum" sz="quarter" idx="10"/>
-          </p:nvPr>
-        </p:nvSpPr>
-        <p:spPr/>
-        <p:txBody>
-          <a:bodyPr/>
-          <a:lstStyle/>
-          <a:p>
-            <a:fld id="{0A6A02C2-54F5-2849-892A-FAF5B04F0FA3}" type="slidenum">
-              <a:rPr lang="en-US" smtClean="0"/>
-              <a:t>34</a:t>
-            </a:fld>
-            <a:endParaRPr lang="en-US"/>
-          </a:p>
-        </p:txBody>
-      </p:sp>
-    </p:spTree>
-    <p:extLst>
-      <p:ext uri="{BB962C8B-B14F-4D97-AF65-F5344CB8AC3E}">
-        <p14:creationId xmlns:p14="http://schemas.microsoft.com/office/powerpoint/2010/main" val="1396381587"/>
-      </p:ext>
-    </p:extLst>
-  </p:cSld>
-  <p:clrMapOvr>
-    <a:masterClrMapping/>
-  </p:clrMapOvr>
-</p:notes>
-</file>
-
-<file path=ppt/notesSlides/notesSlide4.xml><?xml version="1.0" encoding="utf-8"?>
-<p:notes xmlns:a="http://schemas.openxmlformats.org/drawingml/2006/main" xmlns:r="http://schemas.openxmlformats.org/officeDocument/2006/relationships" xmlns:p="http://schemas.openxmlformats.org/presentationml/2006/main">
-  <p:cSld>
-    <p:spTree>
-      <p:nvGrpSpPr>
-        <p:cNvPr id="1" name=""/>
-        <p:cNvGrpSpPr/>
-        <p:nvPr/>
-      </p:nvGrpSpPr>
-      <p:grpSpPr>
-        <a:xfrm>
-          <a:off x="0" y="0"/>
-          <a:ext cx="0" cy="0"/>
-          <a:chOff x="0" y="0"/>
-          <a:chExt cx="0" cy="0"/>
-        </a:xfrm>
-      </p:grpSpPr>
-      <p:sp>
-        <p:nvSpPr>
-          <p:cNvPr id="2" name="Slide Image Placeholder 1"/>
-          <p:cNvSpPr>
-            <a:spLocks noGrp="1" noRot="1" noChangeAspect="1"/>
-          </p:cNvSpPr>
-          <p:nvPr>
-            <p:ph type="sldImg"/>
-          </p:nvPr>
-        </p:nvSpPr>
-        <p:spPr/>
-      </p:sp>
-      <p:sp>
-        <p:nvSpPr>
-          <p:cNvPr id="3" name="Notes Placeholder 2"/>
-          <p:cNvSpPr>
-            <a:spLocks noGrp="1"/>
-          </p:cNvSpPr>
-          <p:nvPr>
-            <p:ph type="body" idx="1"/>
-          </p:nvPr>
-        </p:nvSpPr>
-        <p:spPr/>
-        <p:txBody>
-          <a:bodyPr/>
-          <a:lstStyle/>
-          <a:p>
-            <a:endParaRPr lang="en-US" dirty="0"/>
-          </a:p>
-        </p:txBody>
-      </p:sp>
-      <p:sp>
-        <p:nvSpPr>
-          <p:cNvPr id="4" name="Slide Number Placeholder 3"/>
-          <p:cNvSpPr>
-            <a:spLocks noGrp="1"/>
-          </p:cNvSpPr>
-          <p:nvPr>
-            <p:ph type="sldNum" sz="quarter" idx="10"/>
-          </p:nvPr>
-        </p:nvSpPr>
-        <p:spPr/>
-        <p:txBody>
-          <a:bodyPr/>
-          <a:lstStyle/>
-          <a:p>
-            <a:fld id="{0A6A02C2-54F5-2849-892A-FAF5B04F0FA3}" type="slidenum">
-              <a:rPr lang="en-US" smtClean="0"/>
-              <a:t>35</a:t>
-            </a:fld>
-            <a:endParaRPr lang="en-US"/>
-          </a:p>
-        </p:txBody>
-      </p:sp>
-    </p:spTree>
-    <p:extLst>
-      <p:ext uri="{BB962C8B-B14F-4D97-AF65-F5344CB8AC3E}">
-        <p14:creationId xmlns:p14="http://schemas.microsoft.com/office/powerpoint/2010/main" val="966429095"/>
-      </p:ext>
-    </p:extLst>
-  </p:cSld>
-  <p:clrMapOvr>
-    <a:masterClrMapping/>
-  </p:clrMapOvr>
-</p:notes>
-</file>
-
-<file path=ppt/notesSlides/notesSlide5.xml><?xml version="1.0" encoding="utf-8"?>
-<p:notes xmlns:a="http://schemas.openxmlformats.org/drawingml/2006/main" xmlns:r="http://schemas.openxmlformats.org/officeDocument/2006/relationships" xmlns:p="http://schemas.openxmlformats.org/presentationml/2006/main">
-  <p:cSld>
-    <p:spTree>
-      <p:nvGrpSpPr>
-        <p:cNvPr id="1" name=""/>
-        <p:cNvGrpSpPr/>
-        <p:nvPr/>
-      </p:nvGrpSpPr>
-      <p:grpSpPr>
-        <a:xfrm>
-          <a:off x="0" y="0"/>
-          <a:ext cx="0" cy="0"/>
-          <a:chOff x="0" y="0"/>
-          <a:chExt cx="0" cy="0"/>
-        </a:xfrm>
-      </p:grpSpPr>
-      <p:sp>
-        <p:nvSpPr>
-          <p:cNvPr id="2" name="Slide Image Placeholder 1"/>
-          <p:cNvSpPr>
-            <a:spLocks noGrp="1" noRot="1" noChangeAspect="1"/>
-          </p:cNvSpPr>
-          <p:nvPr>
-            <p:ph type="sldImg"/>
-          </p:nvPr>
-        </p:nvSpPr>
-        <p:spPr/>
-      </p:sp>
-      <p:sp>
-        <p:nvSpPr>
-          <p:cNvPr id="3" name="Notes Placeholder 2"/>
-          <p:cNvSpPr>
-            <a:spLocks noGrp="1"/>
-          </p:cNvSpPr>
-          <p:nvPr>
-            <p:ph type="body" idx="1"/>
-          </p:nvPr>
-        </p:nvSpPr>
-        <p:spPr/>
-        <p:txBody>
-          <a:bodyPr/>
-          <a:lstStyle/>
-          <a:p>
-            <a:endParaRPr lang="en-US" dirty="0"/>
-          </a:p>
-        </p:txBody>
-      </p:sp>
-      <p:sp>
-        <p:nvSpPr>
-          <p:cNvPr id="4" name="Slide Number Placeholder 3"/>
-          <p:cNvSpPr>
-            <a:spLocks noGrp="1"/>
-          </p:cNvSpPr>
-          <p:nvPr>
-            <p:ph type="sldNum" sz="quarter" idx="10"/>
-          </p:nvPr>
-        </p:nvSpPr>
-        <p:spPr/>
-        <p:txBody>
-          <a:bodyPr/>
-          <a:lstStyle/>
-          <a:p>
-            <a:fld id="{0A6A02C2-54F5-2849-892A-FAF5B04F0FA3}" type="slidenum">
-              <a:rPr lang="en-US" smtClean="0"/>
-              <a:t>36</a:t>
-            </a:fld>
-            <a:endParaRPr lang="en-US"/>
-          </a:p>
-        </p:txBody>
-      </p:sp>
-    </p:spTree>
-    <p:extLst>
-      <p:ext uri="{BB962C8B-B14F-4D97-AF65-F5344CB8AC3E}">
-        <p14:creationId xmlns:p14="http://schemas.microsoft.com/office/powerpoint/2010/main" val="118902670"/>
-      </p:ext>
-    </p:extLst>
-  </p:cSld>
-  <p:clrMapOvr>
-    <a:masterClrMapping/>
-  </p:clrMapOvr>
-</p:notes>
-</file>
-
 <file path=ppt/slideLayouts/slideLayout1.xml><?xml version="1.0" encoding="utf-8"?>
 <p:sldLayout xmlns:a="http://schemas.openxmlformats.org/drawingml/2006/main" xmlns:r="http://schemas.openxmlformats.org/officeDocument/2006/relationships" xmlns:p="http://schemas.openxmlformats.org/presentationml/2006/main" showMasterSp="0" type="title" preserve="1">
   <p:cSld name="Title Slide">
@@ -1186,7 +756,7 @@
             <a:fld id="{5586B75A-687E-405C-8A0B-8D00578BA2C3}" type="datetimeFigureOut">
               <a:rPr lang="en-US" dirty="0"/>
               <a:pPr/>
-              <a:t>6/8/17</a:t>
+              <a:t>6/15/17</a:t>
             </a:fld>
             <a:endParaRPr lang="en-US" dirty="0"/>
           </a:p>
@@ -1353,7 +923,7 @@
             <a:fld id="{5586B75A-687E-405C-8A0B-8D00578BA2C3}" type="datetimeFigureOut">
               <a:rPr lang="en-US" dirty="0"/>
               <a:pPr/>
-              <a:t>6/8/17</a:t>
+              <a:t>6/15/17</a:t>
             </a:fld>
             <a:endParaRPr lang="en-US" dirty="0"/>
           </a:p>
@@ -1530,7 +1100,7 @@
             <a:fld id="{5586B75A-687E-405C-8A0B-8D00578BA2C3}" type="datetimeFigureOut">
               <a:rPr lang="en-US" dirty="0"/>
               <a:pPr/>
-              <a:t>6/8/17</a:t>
+              <a:t>6/15/17</a:t>
             </a:fld>
             <a:endParaRPr lang="en-US" dirty="0"/>
           </a:p>
@@ -1697,7 +1267,7 @@
             <a:fld id="{5586B75A-687E-405C-8A0B-8D00578BA2C3}" type="datetimeFigureOut">
               <a:rPr lang="en-US" dirty="0"/>
               <a:pPr/>
-              <a:t>6/8/17</a:t>
+              <a:t>6/15/17</a:t>
             </a:fld>
             <a:endParaRPr lang="en-US" dirty="0"/>
           </a:p>
@@ -1952,7 +1522,7 @@
             <a:fld id="{5586B75A-687E-405C-8A0B-8D00578BA2C3}" type="datetimeFigureOut">
               <a:rPr lang="en-US" dirty="0"/>
               <a:pPr/>
-              <a:t>6/8/17</a:t>
+              <a:t>6/15/17</a:t>
             </a:fld>
             <a:endParaRPr lang="en-US" dirty="0"/>
           </a:p>
@@ -2237,7 +1807,7 @@
             <a:fld id="{5586B75A-687E-405C-8A0B-8D00578BA2C3}" type="datetimeFigureOut">
               <a:rPr lang="en-US" dirty="0"/>
               <a:pPr/>
-              <a:t>6/8/17</a:t>
+              <a:t>6/15/17</a:t>
             </a:fld>
             <a:endParaRPr lang="en-US" dirty="0"/>
           </a:p>
@@ -2676,7 +2246,7 @@
             <a:fld id="{5586B75A-687E-405C-8A0B-8D00578BA2C3}" type="datetimeFigureOut">
               <a:rPr lang="en-US" dirty="0"/>
               <a:pPr/>
-              <a:t>6/8/17</a:t>
+              <a:t>6/15/17</a:t>
             </a:fld>
             <a:endParaRPr lang="en-US" dirty="0"/>
           </a:p>
@@ -2791,7 +2361,7 @@
             <a:fld id="{5586B75A-687E-405C-8A0B-8D00578BA2C3}" type="datetimeFigureOut">
               <a:rPr lang="en-US" dirty="0"/>
               <a:pPr/>
-              <a:t>6/8/17</a:t>
+              <a:t>6/15/17</a:t>
             </a:fld>
             <a:endParaRPr lang="en-US" dirty="0"/>
           </a:p>
@@ -2883,7 +2453,7 @@
             <a:fld id="{5586B75A-687E-405C-8A0B-8D00578BA2C3}" type="datetimeFigureOut">
               <a:rPr lang="en-US" dirty="0"/>
               <a:pPr/>
-              <a:t>6/8/17</a:t>
+              <a:t>6/15/17</a:t>
             </a:fld>
             <a:endParaRPr lang="en-US" dirty="0"/>
           </a:p>
@@ -3168,7 +2738,7 @@
             <a:fld id="{5586B75A-687E-405C-8A0B-8D00578BA2C3}" type="datetimeFigureOut">
               <a:rPr lang="en-US" dirty="0"/>
               <a:pPr/>
-              <a:t>6/8/17</a:t>
+              <a:t>6/15/17</a:t>
             </a:fld>
             <a:endParaRPr lang="en-US" dirty="0"/>
           </a:p>
@@ -3438,7 +3008,7 @@
             <a:fld id="{5586B75A-687E-405C-8A0B-8D00578BA2C3}" type="datetimeFigureOut">
               <a:rPr lang="en-US" dirty="0"/>
               <a:pPr/>
-              <a:t>6/8/17</a:t>
+              <a:t>6/15/17</a:t>
             </a:fld>
             <a:endParaRPr lang="en-US" dirty="0"/>
           </a:p>
@@ -3732,7 +3302,7 @@
             <a:fld id="{5586B75A-687E-405C-8A0B-8D00578BA2C3}" type="datetimeFigureOut">
               <a:rPr lang="en-US" dirty="0"/>
               <a:pPr/>
-              <a:t>6/8/17</a:t>
+              <a:t>6/15/17</a:t>
             </a:fld>
             <a:endParaRPr lang="en-US" dirty="0"/>
           </a:p>
@@ -5769,846 +5339,6 @@
         </p:nvSpPr>
         <p:spPr/>
         <p:txBody>
-          <a:bodyPr/>
-          <a:lstStyle/>
-          <a:p>
-            <a:r>
-              <a:rPr lang="en-US" dirty="0" smtClean="0"/>
-              <a:t>Interesting Findings</a:t>
-            </a:r>
-            <a:br>
-              <a:rPr lang="en-US" dirty="0" smtClean="0"/>
-            </a:br>
-            <a:r>
-              <a:rPr lang="en-US" sz="2400" dirty="0" smtClean="0"/>
-              <a:t>Influence Plots for Train and Test Datasets</a:t>
-            </a:r>
-            <a:endParaRPr lang="en-US" dirty="0"/>
-          </a:p>
-        </p:txBody>
-      </p:sp>
-      <p:sp>
-        <p:nvSpPr>
-          <p:cNvPr id="5" name="Text Placeholder 4"/>
-          <p:cNvSpPr>
-            <a:spLocks noGrp="1"/>
-          </p:cNvSpPr>
-          <p:nvPr>
-            <p:ph type="body" idx="1"/>
-          </p:nvPr>
-        </p:nvSpPr>
-        <p:spPr>
-          <a:xfrm>
-            <a:off x="4379190" y="1859330"/>
-            <a:ext cx="3034333" cy="807720"/>
-          </a:xfrm>
-        </p:spPr>
-        <p:txBody>
-          <a:bodyPr/>
-          <a:lstStyle/>
-          <a:p>
-            <a:r>
-              <a:rPr lang="en-US" dirty="0" smtClean="0"/>
-              <a:t>Influence Plot for </a:t>
-            </a:r>
-            <a:r>
-              <a:rPr lang="en-US" dirty="0" smtClean="0">
-                <a:solidFill>
-                  <a:srgbClr val="FF0000"/>
-                </a:solidFill>
-              </a:rPr>
-              <a:t>Train</a:t>
-            </a:r>
-            <a:r>
-              <a:rPr lang="en-US" dirty="0" smtClean="0"/>
-              <a:t> Dataset</a:t>
-            </a:r>
-            <a:endParaRPr lang="en-US" dirty="0"/>
-          </a:p>
-        </p:txBody>
-      </p:sp>
-      <p:sp>
-        <p:nvSpPr>
-          <p:cNvPr id="6" name="Text Placeholder 5"/>
-          <p:cNvSpPr>
-            <a:spLocks noGrp="1"/>
-          </p:cNvSpPr>
-          <p:nvPr>
-            <p:ph type="body" sz="quarter" idx="3"/>
-          </p:nvPr>
-        </p:nvSpPr>
-        <p:spPr>
-          <a:xfrm>
-            <a:off x="8369065" y="1918324"/>
-            <a:ext cx="3474720" cy="813171"/>
-          </a:xfrm>
-        </p:spPr>
-        <p:txBody>
-          <a:bodyPr/>
-          <a:lstStyle/>
-          <a:p>
-            <a:r>
-              <a:rPr lang="en-US" dirty="0" smtClean="0"/>
-              <a:t>Influence Plot for </a:t>
-            </a:r>
-            <a:r>
-              <a:rPr lang="en-US" dirty="0" smtClean="0">
-                <a:solidFill>
-                  <a:srgbClr val="FF0000"/>
-                </a:solidFill>
-              </a:rPr>
-              <a:t>Test</a:t>
-            </a:r>
-            <a:r>
-              <a:rPr lang="en-US" dirty="0" smtClean="0"/>
-              <a:t> Dataset</a:t>
-            </a:r>
-            <a:endParaRPr lang="en-US" dirty="0"/>
-          </a:p>
-        </p:txBody>
-      </p:sp>
-      <p:pic>
-        <p:nvPicPr>
-          <p:cNvPr id="13" name="Content Placeholder 12"/>
-          <p:cNvPicPr>
-            <a:picLocks noGrp="1" noChangeAspect="1"/>
-          </p:cNvPicPr>
-          <p:nvPr>
-            <p:ph sz="quarter" idx="4"/>
-          </p:nvPr>
-        </p:nvPicPr>
-        <p:blipFill>
-          <a:blip r:embed="rId2">
-            <a:extLst>
-              <a:ext uri="{28A0092B-C50C-407E-A947-70E740481C1C}">
-                <a14:useLocalDpi xmlns:a14="http://schemas.microsoft.com/office/drawing/2010/main" val="0"/>
-              </a:ext>
-            </a:extLst>
-          </a:blip>
-          <a:stretch>
-            <a:fillRect/>
-          </a:stretch>
-        </p:blipFill>
-        <p:spPr>
-          <a:xfrm>
-            <a:off x="7796981" y="2802789"/>
-            <a:ext cx="3948484" cy="2703276"/>
-          </a:xfrm>
-        </p:spPr>
-      </p:pic>
-      <p:pic>
-        <p:nvPicPr>
-          <p:cNvPr id="12" name="Content Placeholder 11"/>
-          <p:cNvPicPr>
-            <a:picLocks noGrp="1" noChangeAspect="1"/>
-          </p:cNvPicPr>
-          <p:nvPr>
-            <p:ph sz="half" idx="2"/>
-          </p:nvPr>
-        </p:nvPicPr>
-        <p:blipFill>
-          <a:blip r:embed="rId3">
-            <a:extLst>
-              <a:ext uri="{28A0092B-C50C-407E-A947-70E740481C1C}">
-                <a14:useLocalDpi xmlns:a14="http://schemas.microsoft.com/office/drawing/2010/main" val="0"/>
-              </a:ext>
-            </a:extLst>
-          </a:blip>
-          <a:stretch>
-            <a:fillRect/>
-          </a:stretch>
-        </p:blipFill>
-        <p:spPr>
-          <a:xfrm>
-            <a:off x="3523023" y="2843643"/>
-            <a:ext cx="4277804" cy="2632926"/>
-          </a:xfrm>
-        </p:spPr>
-      </p:pic>
-      <p:sp>
-        <p:nvSpPr>
-          <p:cNvPr id="14" name="TextBox 13"/>
-          <p:cNvSpPr txBox="1"/>
-          <p:nvPr/>
-        </p:nvSpPr>
-        <p:spPr>
-          <a:xfrm>
-            <a:off x="6577780" y="5614219"/>
-            <a:ext cx="2644877" cy="369332"/>
-          </a:xfrm>
-          <a:prstGeom prst="rect">
-            <a:avLst/>
-          </a:prstGeom>
-          <a:noFill/>
-        </p:spPr>
-        <p:txBody>
-          <a:bodyPr wrap="square" rtlCol="0">
-            <a:spAutoFit/>
-          </a:bodyPr>
-          <a:lstStyle/>
-          <a:p>
-            <a:r>
-              <a:rPr lang="en-US" dirty="0" smtClean="0">
-                <a:solidFill>
-                  <a:srgbClr val="FF0000"/>
-                </a:solidFill>
-              </a:rPr>
-              <a:t>Notice the scale variation</a:t>
-            </a:r>
-            <a:endParaRPr lang="en-US" dirty="0">
-              <a:solidFill>
-                <a:srgbClr val="FF0000"/>
-              </a:solidFill>
-            </a:endParaRPr>
-          </a:p>
-        </p:txBody>
-      </p:sp>
-    </p:spTree>
-    <p:extLst>
-      <p:ext uri="{BB962C8B-B14F-4D97-AF65-F5344CB8AC3E}">
-        <p14:creationId xmlns:p14="http://schemas.microsoft.com/office/powerpoint/2010/main" val="203343848"/>
-      </p:ext>
-    </p:extLst>
-  </p:cSld>
-  <p:clrMapOvr>
-    <a:masterClrMapping/>
-  </p:clrMapOvr>
-</p:sld>
-</file>
-
-<file path=ppt/slides/slide13.xml><?xml version="1.0" encoding="utf-8"?>
-<p:sld xmlns:a="http://schemas.openxmlformats.org/drawingml/2006/main" xmlns:r="http://schemas.openxmlformats.org/officeDocument/2006/relationships" xmlns:p="http://schemas.openxmlformats.org/presentationml/2006/main">
-  <p:cSld>
-    <p:spTree>
-      <p:nvGrpSpPr>
-        <p:cNvPr id="1" name=""/>
-        <p:cNvGrpSpPr/>
-        <p:nvPr/>
-      </p:nvGrpSpPr>
-      <p:grpSpPr>
-        <a:xfrm>
-          <a:off x="0" y="0"/>
-          <a:ext cx="0" cy="0"/>
-          <a:chOff x="0" y="0"/>
-          <a:chExt cx="0" cy="0"/>
-        </a:xfrm>
-      </p:grpSpPr>
-      <p:sp>
-        <p:nvSpPr>
-          <p:cNvPr id="2" name="Title 1"/>
-          <p:cNvSpPr>
-            <a:spLocks noGrp="1"/>
-          </p:cNvSpPr>
-          <p:nvPr>
-            <p:ph type="title"/>
-          </p:nvPr>
-        </p:nvSpPr>
-        <p:spPr/>
-        <p:txBody>
-          <a:bodyPr/>
-          <a:lstStyle/>
-          <a:p>
-            <a:r>
-              <a:rPr lang="en-US" dirty="0" smtClean="0"/>
-              <a:t>Interesting Findings</a:t>
-            </a:r>
-            <a:br>
-              <a:rPr lang="en-US" dirty="0" smtClean="0"/>
-            </a:br>
-            <a:r>
-              <a:rPr lang="en-US" sz="2400" dirty="0" smtClean="0"/>
-              <a:t>Leverage Plots for Train and Test Datasets</a:t>
-            </a:r>
-            <a:endParaRPr lang="en-US" dirty="0"/>
-          </a:p>
-        </p:txBody>
-      </p:sp>
-      <p:sp>
-        <p:nvSpPr>
-          <p:cNvPr id="5" name="Text Placeholder 4"/>
-          <p:cNvSpPr>
-            <a:spLocks noGrp="1"/>
-          </p:cNvSpPr>
-          <p:nvPr>
-            <p:ph type="body" idx="1"/>
-          </p:nvPr>
-        </p:nvSpPr>
-        <p:spPr>
-          <a:xfrm>
-            <a:off x="4379190" y="1859330"/>
-            <a:ext cx="3034333" cy="807720"/>
-          </a:xfrm>
-        </p:spPr>
-        <p:txBody>
-          <a:bodyPr/>
-          <a:lstStyle/>
-          <a:p>
-            <a:endParaRPr lang="en-US" dirty="0"/>
-          </a:p>
-        </p:txBody>
-      </p:sp>
-      <p:sp>
-        <p:nvSpPr>
-          <p:cNvPr id="6" name="Text Placeholder 5"/>
-          <p:cNvSpPr>
-            <a:spLocks noGrp="1"/>
-          </p:cNvSpPr>
-          <p:nvPr>
-            <p:ph type="body" sz="quarter" idx="3"/>
-          </p:nvPr>
-        </p:nvSpPr>
-        <p:spPr>
-          <a:xfrm>
-            <a:off x="8369065" y="1918324"/>
-            <a:ext cx="3474720" cy="813171"/>
-          </a:xfrm>
-        </p:spPr>
-        <p:txBody>
-          <a:bodyPr/>
-          <a:lstStyle/>
-          <a:p>
-            <a:endParaRPr lang="en-US" dirty="0"/>
-          </a:p>
-        </p:txBody>
-      </p:sp>
-      <p:pic>
-        <p:nvPicPr>
-          <p:cNvPr id="8" name="Content Placeholder 7"/>
-          <p:cNvPicPr>
-            <a:picLocks noGrp="1" noChangeAspect="1"/>
-          </p:cNvPicPr>
-          <p:nvPr>
-            <p:ph sz="half" idx="2"/>
-          </p:nvPr>
-        </p:nvPicPr>
-        <p:blipFill>
-          <a:blip r:embed="rId2">
-            <a:extLst>
-              <a:ext uri="{28A0092B-C50C-407E-A947-70E740481C1C}">
-                <a14:useLocalDpi xmlns:a14="http://schemas.microsoft.com/office/drawing/2010/main" val="0"/>
-              </a:ext>
-            </a:extLst>
-          </a:blip>
-          <a:stretch>
-            <a:fillRect/>
-          </a:stretch>
-        </p:blipFill>
-        <p:spPr>
-          <a:xfrm>
-            <a:off x="3867150" y="3775587"/>
-            <a:ext cx="3475038" cy="2365280"/>
-          </a:xfrm>
-        </p:spPr>
-      </p:pic>
-      <p:pic>
-        <p:nvPicPr>
-          <p:cNvPr id="7" name="Content Placeholder 6"/>
-          <p:cNvPicPr>
-            <a:picLocks noGrp="1" noChangeAspect="1"/>
-          </p:cNvPicPr>
-          <p:nvPr>
-            <p:ph sz="quarter" idx="4"/>
-          </p:nvPr>
-        </p:nvPicPr>
-        <p:blipFill>
-          <a:blip r:embed="rId3">
-            <a:extLst>
-              <a:ext uri="{28A0092B-C50C-407E-A947-70E740481C1C}">
-                <a14:useLocalDpi xmlns:a14="http://schemas.microsoft.com/office/drawing/2010/main" val="0"/>
-              </a:ext>
-            </a:extLst>
-          </a:blip>
-          <a:stretch>
-            <a:fillRect/>
-          </a:stretch>
-        </p:blipFill>
-        <p:spPr>
-          <a:xfrm>
-            <a:off x="3885529" y="1123838"/>
-            <a:ext cx="3475037" cy="2344468"/>
-          </a:xfrm>
-        </p:spPr>
-      </p:pic>
-      <p:pic>
-        <p:nvPicPr>
-          <p:cNvPr id="11" name="Picture 10"/>
-          <p:cNvPicPr>
-            <a:picLocks noChangeAspect="1"/>
-          </p:cNvPicPr>
-          <p:nvPr/>
-        </p:nvPicPr>
-        <p:blipFill>
-          <a:blip r:embed="rId4">
-            <a:extLst>
-              <a:ext uri="{28A0092B-C50C-407E-A947-70E740481C1C}">
-                <a14:useLocalDpi xmlns:a14="http://schemas.microsoft.com/office/drawing/2010/main" val="0"/>
-              </a:ext>
-            </a:extLst>
-          </a:blip>
-          <a:stretch>
-            <a:fillRect/>
-          </a:stretch>
-        </p:blipFill>
-        <p:spPr>
-          <a:xfrm>
-            <a:off x="7507491" y="1081543"/>
-            <a:ext cx="3918822" cy="2467902"/>
-          </a:xfrm>
-          <a:prstGeom prst="rect">
-            <a:avLst/>
-          </a:prstGeom>
-        </p:spPr>
-      </p:pic>
-      <p:pic>
-        <p:nvPicPr>
-          <p:cNvPr id="15" name="Picture 14"/>
-          <p:cNvPicPr>
-            <a:picLocks noChangeAspect="1"/>
-          </p:cNvPicPr>
-          <p:nvPr/>
-        </p:nvPicPr>
-        <p:blipFill>
-          <a:blip r:embed="rId5">
-            <a:extLst>
-              <a:ext uri="{28A0092B-C50C-407E-A947-70E740481C1C}">
-                <a14:useLocalDpi xmlns:a14="http://schemas.microsoft.com/office/drawing/2010/main" val="0"/>
-              </a:ext>
-            </a:extLst>
-          </a:blip>
-          <a:stretch>
-            <a:fillRect/>
-          </a:stretch>
-        </p:blipFill>
-        <p:spPr>
-          <a:xfrm>
-            <a:off x="7360565" y="3817512"/>
-            <a:ext cx="4065747" cy="2199828"/>
-          </a:xfrm>
-          <a:prstGeom prst="rect">
-            <a:avLst/>
-          </a:prstGeom>
-        </p:spPr>
-      </p:pic>
-      <p:sp>
-        <p:nvSpPr>
-          <p:cNvPr id="16" name="TextBox 15"/>
-          <p:cNvSpPr txBox="1"/>
-          <p:nvPr/>
-        </p:nvSpPr>
-        <p:spPr>
-          <a:xfrm>
-            <a:off x="7757652" y="835742"/>
-            <a:ext cx="3519948" cy="369332"/>
-          </a:xfrm>
-          <a:prstGeom prst="rect">
-            <a:avLst/>
-          </a:prstGeom>
-          <a:noFill/>
-        </p:spPr>
-        <p:txBody>
-          <a:bodyPr wrap="square" rtlCol="0">
-            <a:spAutoFit/>
-          </a:bodyPr>
-          <a:lstStyle/>
-          <a:p>
-            <a:pPr algn="ctr"/>
-            <a:r>
-              <a:rPr lang="en-US" dirty="0" smtClean="0">
-                <a:solidFill>
-                  <a:srgbClr val="FF0000"/>
-                </a:solidFill>
-              </a:rPr>
-              <a:t>Test Leverage Plots </a:t>
-            </a:r>
-            <a:endParaRPr lang="en-US" dirty="0">
-              <a:solidFill>
-                <a:srgbClr val="FF0000"/>
-              </a:solidFill>
-            </a:endParaRPr>
-          </a:p>
-        </p:txBody>
-      </p:sp>
-      <p:sp>
-        <p:nvSpPr>
-          <p:cNvPr id="17" name="TextBox 16"/>
-          <p:cNvSpPr txBox="1"/>
-          <p:nvPr/>
-        </p:nvSpPr>
-        <p:spPr>
-          <a:xfrm>
-            <a:off x="4031226" y="835742"/>
-            <a:ext cx="3205316" cy="369332"/>
-          </a:xfrm>
-          <a:prstGeom prst="rect">
-            <a:avLst/>
-          </a:prstGeom>
-          <a:noFill/>
-        </p:spPr>
-        <p:txBody>
-          <a:bodyPr wrap="square" rtlCol="0">
-            <a:spAutoFit/>
-          </a:bodyPr>
-          <a:lstStyle/>
-          <a:p>
-            <a:pPr algn="ctr"/>
-            <a:r>
-              <a:rPr lang="en-US" dirty="0" smtClean="0">
-                <a:solidFill>
-                  <a:srgbClr val="FF0000"/>
-                </a:solidFill>
-              </a:rPr>
-              <a:t>Train Leverage Plots</a:t>
-            </a:r>
-            <a:endParaRPr lang="en-US" dirty="0">
-              <a:solidFill>
-                <a:srgbClr val="FF0000"/>
-              </a:solidFill>
-            </a:endParaRPr>
-          </a:p>
-        </p:txBody>
-      </p:sp>
-      <p:sp>
-        <p:nvSpPr>
-          <p:cNvPr id="18" name="TextBox 17"/>
-          <p:cNvSpPr txBox="1"/>
-          <p:nvPr/>
-        </p:nvSpPr>
-        <p:spPr>
-          <a:xfrm>
-            <a:off x="6405716" y="5771535"/>
-            <a:ext cx="2703871" cy="338554"/>
-          </a:xfrm>
-          <a:prstGeom prst="rect">
-            <a:avLst/>
-          </a:prstGeom>
-          <a:noFill/>
-        </p:spPr>
-        <p:txBody>
-          <a:bodyPr wrap="square" rtlCol="0">
-            <a:spAutoFit/>
-          </a:bodyPr>
-          <a:lstStyle/>
-          <a:p>
-            <a:r>
-              <a:rPr lang="en-US" sz="1600" dirty="0" smtClean="0">
-                <a:solidFill>
-                  <a:srgbClr val="FF0000"/>
-                </a:solidFill>
-              </a:rPr>
-              <a:t>Notice the scale variance.</a:t>
-            </a:r>
-            <a:endParaRPr lang="en-US" sz="1600" dirty="0">
-              <a:solidFill>
-                <a:srgbClr val="FF0000"/>
-              </a:solidFill>
-            </a:endParaRPr>
-          </a:p>
-        </p:txBody>
-      </p:sp>
-    </p:spTree>
-    <p:extLst>
-      <p:ext uri="{BB962C8B-B14F-4D97-AF65-F5344CB8AC3E}">
-        <p14:creationId xmlns:p14="http://schemas.microsoft.com/office/powerpoint/2010/main" val="2056826211"/>
-      </p:ext>
-    </p:extLst>
-  </p:cSld>
-  <p:clrMapOvr>
-    <a:masterClrMapping/>
-  </p:clrMapOvr>
-</p:sld>
-</file>
-
-<file path=ppt/slides/slide14.xml><?xml version="1.0" encoding="utf-8"?>
-<p:sld xmlns:a="http://schemas.openxmlformats.org/drawingml/2006/main" xmlns:r="http://schemas.openxmlformats.org/officeDocument/2006/relationships" xmlns:p="http://schemas.openxmlformats.org/presentationml/2006/main">
-  <p:cSld>
-    <p:spTree>
-      <p:nvGrpSpPr>
-        <p:cNvPr id="1" name=""/>
-        <p:cNvGrpSpPr/>
-        <p:nvPr/>
-      </p:nvGrpSpPr>
-      <p:grpSpPr>
-        <a:xfrm>
-          <a:off x="0" y="0"/>
-          <a:ext cx="0" cy="0"/>
-          <a:chOff x="0" y="0"/>
-          <a:chExt cx="0" cy="0"/>
-        </a:xfrm>
-      </p:grpSpPr>
-      <p:sp>
-        <p:nvSpPr>
-          <p:cNvPr id="2" name="Title 1"/>
-          <p:cNvSpPr>
-            <a:spLocks noGrp="1"/>
-          </p:cNvSpPr>
-          <p:nvPr>
-            <p:ph type="title"/>
-          </p:nvPr>
-        </p:nvSpPr>
-        <p:spPr/>
-        <p:txBody>
-          <a:bodyPr/>
-          <a:lstStyle/>
-          <a:p>
-            <a:r>
-              <a:rPr lang="en-US" dirty="0" smtClean="0"/>
-              <a:t>Interesting Findings</a:t>
-            </a:r>
-            <a:br>
-              <a:rPr lang="en-US" dirty="0" smtClean="0"/>
-            </a:br>
-            <a:r>
-              <a:rPr lang="en-US" sz="2400" dirty="0" smtClean="0"/>
-              <a:t>Added Variables Plots for Train and Test Datasets</a:t>
-            </a:r>
-            <a:endParaRPr lang="en-US" dirty="0"/>
-          </a:p>
-        </p:txBody>
-      </p:sp>
-      <p:sp>
-        <p:nvSpPr>
-          <p:cNvPr id="5" name="Text Placeholder 4"/>
-          <p:cNvSpPr>
-            <a:spLocks noGrp="1"/>
-          </p:cNvSpPr>
-          <p:nvPr>
-            <p:ph type="body" idx="1"/>
-          </p:nvPr>
-        </p:nvSpPr>
-        <p:spPr>
-          <a:xfrm>
-            <a:off x="3856031" y="482811"/>
-            <a:ext cx="3475037" cy="807720"/>
-          </a:xfrm>
-        </p:spPr>
-        <p:txBody>
-          <a:bodyPr>
-            <a:normAutofit/>
-          </a:bodyPr>
-          <a:lstStyle/>
-          <a:p>
-            <a:r>
-              <a:rPr lang="en-US" sz="1800" dirty="0" smtClean="0"/>
-              <a:t>Added Variables for </a:t>
-            </a:r>
-            <a:r>
-              <a:rPr lang="en-US" sz="1800" dirty="0" smtClean="0">
-                <a:solidFill>
-                  <a:srgbClr val="FF0000"/>
-                </a:solidFill>
-              </a:rPr>
-              <a:t>Train</a:t>
-            </a:r>
-            <a:r>
-              <a:rPr lang="en-US" sz="1800" dirty="0" smtClean="0"/>
-              <a:t> Dataset</a:t>
-            </a:r>
-            <a:endParaRPr lang="en-US" sz="1800" dirty="0"/>
-          </a:p>
-        </p:txBody>
-      </p:sp>
-      <p:sp>
-        <p:nvSpPr>
-          <p:cNvPr id="6" name="Text Placeholder 5"/>
-          <p:cNvSpPr>
-            <a:spLocks noGrp="1"/>
-          </p:cNvSpPr>
-          <p:nvPr>
-            <p:ph type="body" sz="quarter" idx="3"/>
-          </p:nvPr>
-        </p:nvSpPr>
-        <p:spPr>
-          <a:xfrm>
-            <a:off x="8015104" y="492646"/>
-            <a:ext cx="3474720" cy="813171"/>
-          </a:xfrm>
-        </p:spPr>
-        <p:txBody>
-          <a:bodyPr>
-            <a:normAutofit/>
-          </a:bodyPr>
-          <a:lstStyle/>
-          <a:p>
-            <a:r>
-              <a:rPr lang="en-US" sz="1800" dirty="0" smtClean="0"/>
-              <a:t>Added Variables for </a:t>
-            </a:r>
-            <a:r>
-              <a:rPr lang="en-US" sz="1800" dirty="0" smtClean="0">
-                <a:solidFill>
-                  <a:srgbClr val="FF0000"/>
-                </a:solidFill>
-              </a:rPr>
-              <a:t>Test</a:t>
-            </a:r>
-            <a:r>
-              <a:rPr lang="en-US" sz="1800" dirty="0" smtClean="0"/>
-              <a:t> Dataset</a:t>
-            </a:r>
-            <a:endParaRPr lang="en-US" sz="1800" dirty="0"/>
-          </a:p>
-        </p:txBody>
-      </p:sp>
-      <p:pic>
-        <p:nvPicPr>
-          <p:cNvPr id="7" name="Content Placeholder 6"/>
-          <p:cNvPicPr>
-            <a:picLocks noGrp="1" noChangeAspect="1"/>
-          </p:cNvPicPr>
-          <p:nvPr>
-            <p:ph sz="half" idx="2"/>
-          </p:nvPr>
-        </p:nvPicPr>
-        <p:blipFill>
-          <a:blip r:embed="rId2">
-            <a:extLst>
-              <a:ext uri="{28A0092B-C50C-407E-A947-70E740481C1C}">
-                <a14:useLocalDpi xmlns:a14="http://schemas.microsoft.com/office/drawing/2010/main" val="0"/>
-              </a:ext>
-            </a:extLst>
-          </a:blip>
-          <a:stretch>
-            <a:fillRect/>
-          </a:stretch>
-        </p:blipFill>
-        <p:spPr>
-          <a:xfrm>
-            <a:off x="3867150" y="1582995"/>
-            <a:ext cx="3475038" cy="2367096"/>
-          </a:xfrm>
-        </p:spPr>
-      </p:pic>
-      <p:pic>
-        <p:nvPicPr>
-          <p:cNvPr id="8" name="Content Placeholder 7"/>
-          <p:cNvPicPr>
-            <a:picLocks noGrp="1" noChangeAspect="1"/>
-          </p:cNvPicPr>
-          <p:nvPr>
-            <p:ph sz="quarter" idx="4"/>
-          </p:nvPr>
-        </p:nvPicPr>
-        <p:blipFill>
-          <a:blip r:embed="rId3">
-            <a:extLst>
-              <a:ext uri="{28A0092B-C50C-407E-A947-70E740481C1C}">
-                <a14:useLocalDpi xmlns:a14="http://schemas.microsoft.com/office/drawing/2010/main" val="0"/>
-              </a:ext>
-            </a:extLst>
-          </a:blip>
-          <a:stretch>
-            <a:fillRect/>
-          </a:stretch>
-        </p:blipFill>
-        <p:spPr>
-          <a:xfrm>
-            <a:off x="3865863" y="4178710"/>
-            <a:ext cx="3475037" cy="2406429"/>
-          </a:xfrm>
-        </p:spPr>
-      </p:pic>
-      <p:pic>
-        <p:nvPicPr>
-          <p:cNvPr id="9" name="Picture 8"/>
-          <p:cNvPicPr>
-            <a:picLocks noChangeAspect="1"/>
-          </p:cNvPicPr>
-          <p:nvPr/>
-        </p:nvPicPr>
-        <p:blipFill>
-          <a:blip r:embed="rId4">
-            <a:extLst>
-              <a:ext uri="{28A0092B-C50C-407E-A947-70E740481C1C}">
-                <a14:useLocalDpi xmlns:a14="http://schemas.microsoft.com/office/drawing/2010/main" val="0"/>
-              </a:ext>
-            </a:extLst>
-          </a:blip>
-          <a:stretch>
-            <a:fillRect/>
-          </a:stretch>
-        </p:blipFill>
-        <p:spPr>
-          <a:xfrm>
-            <a:off x="7523604" y="1582994"/>
-            <a:ext cx="4217347" cy="2367097"/>
-          </a:xfrm>
-          <a:prstGeom prst="rect">
-            <a:avLst/>
-          </a:prstGeom>
-        </p:spPr>
-      </p:pic>
-      <p:pic>
-        <p:nvPicPr>
-          <p:cNvPr id="10" name="Picture 9"/>
-          <p:cNvPicPr>
-            <a:picLocks noChangeAspect="1"/>
-          </p:cNvPicPr>
-          <p:nvPr/>
-        </p:nvPicPr>
-        <p:blipFill>
-          <a:blip r:embed="rId5">
-            <a:extLst>
-              <a:ext uri="{28A0092B-C50C-407E-A947-70E740481C1C}">
-                <a14:useLocalDpi xmlns:a14="http://schemas.microsoft.com/office/drawing/2010/main" val="0"/>
-              </a:ext>
-            </a:extLst>
-          </a:blip>
-          <a:stretch>
-            <a:fillRect/>
-          </a:stretch>
-        </p:blipFill>
-        <p:spPr>
-          <a:xfrm>
-            <a:off x="7561643" y="4188540"/>
-            <a:ext cx="4179307" cy="2396599"/>
-          </a:xfrm>
-          <a:prstGeom prst="rect">
-            <a:avLst/>
-          </a:prstGeom>
-        </p:spPr>
-      </p:pic>
-    </p:spTree>
-    <p:extLst>
-      <p:ext uri="{BB962C8B-B14F-4D97-AF65-F5344CB8AC3E}">
-        <p14:creationId xmlns:p14="http://schemas.microsoft.com/office/powerpoint/2010/main" val="1674114828"/>
-      </p:ext>
-    </p:extLst>
-  </p:cSld>
-  <p:clrMapOvr>
-    <a:masterClrMapping/>
-  </p:clrMapOvr>
-</p:sld>
-</file>
-
-<file path=ppt/slides/slide15.xml><?xml version="1.0" encoding="utf-8"?>
-<p:sld xmlns:a="http://schemas.openxmlformats.org/drawingml/2006/main" xmlns:r="http://schemas.openxmlformats.org/officeDocument/2006/relationships" xmlns:p="http://schemas.openxmlformats.org/presentationml/2006/main">
-  <p:cSld>
-    <p:spTree>
-      <p:nvGrpSpPr>
-        <p:cNvPr id="1" name=""/>
-        <p:cNvGrpSpPr/>
-        <p:nvPr/>
-      </p:nvGrpSpPr>
-      <p:grpSpPr>
-        <a:xfrm>
-          <a:off x="0" y="0"/>
-          <a:ext cx="0" cy="0"/>
-          <a:chOff x="0" y="0"/>
-          <a:chExt cx="0" cy="0"/>
-        </a:xfrm>
-      </p:grpSpPr>
-      <p:sp>
-        <p:nvSpPr>
-          <p:cNvPr id="2" name="Title 1"/>
-          <p:cNvSpPr>
-            <a:spLocks noGrp="1"/>
-          </p:cNvSpPr>
-          <p:nvPr>
-            <p:ph type="title"/>
-          </p:nvPr>
-        </p:nvSpPr>
-        <p:spPr/>
-        <p:txBody>
           <a:bodyPr>
             <a:normAutofit fontScale="90000"/>
           </a:bodyPr>
@@ -7002,7 +5732,7 @@
 </p:sld>
 </file>
 
-<file path=ppt/slides/slide16.xml><?xml version="1.0" encoding="utf-8"?>
+<file path=ppt/slides/slide13.xml><?xml version="1.0" encoding="utf-8"?>
 <p:sld xmlns:a="http://schemas.openxmlformats.org/drawingml/2006/main" xmlns:r="http://schemas.openxmlformats.org/officeDocument/2006/relationships" xmlns:p="http://schemas.openxmlformats.org/presentationml/2006/main">
   <p:cSld>
     <p:spTree>
@@ -7375,7 +6105,7 @@
 </p:sld>
 </file>
 
-<file path=ppt/slides/slide17.xml><?xml version="1.0" encoding="utf-8"?>
+<file path=ppt/slides/slide14.xml><?xml version="1.0" encoding="utf-8"?>
 <p:sld xmlns:a="http://schemas.openxmlformats.org/drawingml/2006/main" xmlns:r="http://schemas.openxmlformats.org/officeDocument/2006/relationships" xmlns:p="http://schemas.openxmlformats.org/presentationml/2006/main">
   <p:cSld>
     <p:spTree>
@@ -7784,7 +6514,7 @@
 </p:sld>
 </file>
 
-<file path=ppt/slides/slide18.xml><?xml version="1.0" encoding="utf-8"?>
+<file path=ppt/slides/slide15.xml><?xml version="1.0" encoding="utf-8"?>
 <p:sld xmlns:a="http://schemas.openxmlformats.org/drawingml/2006/main" xmlns:r="http://schemas.openxmlformats.org/officeDocument/2006/relationships" xmlns:p="http://schemas.openxmlformats.org/presentationml/2006/main">
   <p:cSld>
     <p:spTree>
@@ -8232,7 +6962,7 @@
 </p:sld>
 </file>
 
-<file path=ppt/slides/slide19.xml><?xml version="1.0" encoding="utf-8"?>
+<file path=ppt/slides/slide16.xml><?xml version="1.0" encoding="utf-8"?>
 <p:sld xmlns:a="http://schemas.openxmlformats.org/drawingml/2006/main" xmlns:r="http://schemas.openxmlformats.org/officeDocument/2006/relationships" xmlns:p="http://schemas.openxmlformats.org/presentationml/2006/main">
   <p:cSld>
     <p:spTree>
@@ -8665,127 +7395,7 @@
 </p:sld>
 </file>
 
-<file path=ppt/slides/slide2.xml><?xml version="1.0" encoding="utf-8"?>
-<p:sld xmlns:a="http://schemas.openxmlformats.org/drawingml/2006/main" xmlns:r="http://schemas.openxmlformats.org/officeDocument/2006/relationships" xmlns:p="http://schemas.openxmlformats.org/presentationml/2006/main">
-  <p:cSld>
-    <p:spTree>
-      <p:nvGrpSpPr>
-        <p:cNvPr id="1" name=""/>
-        <p:cNvGrpSpPr/>
-        <p:nvPr/>
-      </p:nvGrpSpPr>
-      <p:grpSpPr>
-        <a:xfrm>
-          <a:off x="0" y="0"/>
-          <a:ext cx="0" cy="0"/>
-          <a:chOff x="0" y="0"/>
-          <a:chExt cx="0" cy="0"/>
-        </a:xfrm>
-      </p:grpSpPr>
-      <p:sp>
-        <p:nvSpPr>
-          <p:cNvPr id="2" name="Title 1"/>
-          <p:cNvSpPr>
-            <a:spLocks noGrp="1"/>
-          </p:cNvSpPr>
-          <p:nvPr>
-            <p:ph type="title"/>
-          </p:nvPr>
-        </p:nvSpPr>
-        <p:spPr/>
-        <p:txBody>
-          <a:bodyPr/>
-          <a:lstStyle/>
-          <a:p>
-            <a:r>
-              <a:rPr lang="en-US" dirty="0"/>
-              <a:t>Explanation</a:t>
-            </a:r>
-          </a:p>
-        </p:txBody>
-      </p:sp>
-      <p:sp>
-        <p:nvSpPr>
-          <p:cNvPr id="3" name="Content Placeholder 2"/>
-          <p:cNvSpPr>
-            <a:spLocks noGrp="1"/>
-          </p:cNvSpPr>
-          <p:nvPr>
-            <p:ph idx="1"/>
-          </p:nvPr>
-        </p:nvSpPr>
-        <p:spPr/>
-        <p:txBody>
-          <a:bodyPr/>
-          <a:lstStyle/>
-          <a:p>
-            <a:r>
-              <a:rPr lang="en-US" dirty="0" smtClean="0"/>
-              <a:t>Pew Research Center conducted the survey in 2016, calling 2,254 people. There are 1,040 observations with 105 variables included in their data set.</a:t>
-            </a:r>
-          </a:p>
-          <a:p>
-            <a:r>
-              <a:rPr lang="en-US" dirty="0" smtClean="0"/>
-              <a:t>Selected this data to learn about survey data focusing on a current issue </a:t>
-            </a:r>
-            <a:r>
-              <a:rPr lang="mr-IN" dirty="0" smtClean="0"/>
-              <a:t>–</a:t>
-            </a:r>
-            <a:r>
-              <a:rPr lang="en-US" dirty="0" smtClean="0"/>
-              <a:t> Cybersecurity.</a:t>
-            </a:r>
-          </a:p>
-          <a:p>
-            <a:r>
-              <a:rPr lang="en-US" dirty="0" smtClean="0"/>
-              <a:t>Many non-responses, N/A and Don’t </a:t>
-            </a:r>
-            <a:r>
-              <a:rPr lang="en-US" dirty="0" err="1" smtClean="0"/>
-              <a:t>Know’s</a:t>
-            </a:r>
-            <a:r>
-              <a:rPr lang="en-US" dirty="0" smtClean="0"/>
-              <a:t> are included.</a:t>
-            </a:r>
-          </a:p>
-          <a:p>
-            <a:r>
-              <a:rPr lang="en-US" dirty="0" smtClean="0"/>
-              <a:t>Categorical, Ordinal, Interval and Numeric data types make the statistical analysis ”interesting”.</a:t>
-            </a:r>
-          </a:p>
-          <a:p>
-            <a:r>
-              <a:rPr lang="en-US" dirty="0" smtClean="0"/>
-              <a:t>Perspective assumed to identify target audience for marketing a new consumer cyber security application.</a:t>
-            </a:r>
-          </a:p>
-          <a:p>
-            <a:endParaRPr lang="en-US" dirty="0" smtClean="0"/>
-          </a:p>
-          <a:p>
-            <a:endParaRPr lang="en-US" dirty="0"/>
-          </a:p>
-        </p:txBody>
-      </p:sp>
-    </p:spTree>
-    <p:extLst>
-      <p:ext uri="{BB962C8B-B14F-4D97-AF65-F5344CB8AC3E}">
-        <p14:creationId xmlns:p14="http://schemas.microsoft.com/office/powerpoint/2010/main" val="1925931884"/>
-      </p:ext>
-    </p:extLst>
-  </p:cSld>
-  <p:clrMapOvr>
-    <a:masterClrMapping/>
-  </p:clrMapOvr>
-</p:sld>
-</file>
-
-<file path=ppt/slides/slide20.xml><?xml version="1.0" encoding="utf-8"?>
+<file path=ppt/slides/slide17.xml><?xml version="1.0" encoding="utf-8"?>
 <p:sld xmlns:a="http://schemas.openxmlformats.org/drawingml/2006/main" xmlns:r="http://schemas.openxmlformats.org/officeDocument/2006/relationships" xmlns:p="http://schemas.openxmlformats.org/presentationml/2006/main">
   <p:cSld>
     <p:spTree>
@@ -9193,7 +7803,7 @@
 </p:sld>
 </file>
 
-<file path=ppt/slides/slide21.xml><?xml version="1.0" encoding="utf-8"?>
+<file path=ppt/slides/slide18.xml><?xml version="1.0" encoding="utf-8"?>
 <p:sld xmlns:a="http://schemas.openxmlformats.org/drawingml/2006/main" xmlns:r="http://schemas.openxmlformats.org/officeDocument/2006/relationships" xmlns:p="http://schemas.openxmlformats.org/presentationml/2006/main">
   <p:cSld>
     <p:spTree>
@@ -9607,7 +8217,7 @@
 </p:sld>
 </file>
 
-<file path=ppt/slides/slide22.xml><?xml version="1.0" encoding="utf-8"?>
+<file path=ppt/slides/slide19.xml><?xml version="1.0" encoding="utf-8"?>
 <p:sld xmlns:a="http://schemas.openxmlformats.org/drawingml/2006/main" xmlns:r="http://schemas.openxmlformats.org/officeDocument/2006/relationships" xmlns:p="http://schemas.openxmlformats.org/presentationml/2006/main">
   <p:cSld>
     <p:spTree>
@@ -10066,7 +8676,127 @@
 </p:sld>
 </file>
 
-<file path=ppt/slides/slide23.xml><?xml version="1.0" encoding="utf-8"?>
+<file path=ppt/slides/slide2.xml><?xml version="1.0" encoding="utf-8"?>
+<p:sld xmlns:a="http://schemas.openxmlformats.org/drawingml/2006/main" xmlns:r="http://schemas.openxmlformats.org/officeDocument/2006/relationships" xmlns:p="http://schemas.openxmlformats.org/presentationml/2006/main">
+  <p:cSld>
+    <p:spTree>
+      <p:nvGrpSpPr>
+        <p:cNvPr id="1" name=""/>
+        <p:cNvGrpSpPr/>
+        <p:nvPr/>
+      </p:nvGrpSpPr>
+      <p:grpSpPr>
+        <a:xfrm>
+          <a:off x="0" y="0"/>
+          <a:ext cx="0" cy="0"/>
+          <a:chOff x="0" y="0"/>
+          <a:chExt cx="0" cy="0"/>
+        </a:xfrm>
+      </p:grpSpPr>
+      <p:sp>
+        <p:nvSpPr>
+          <p:cNvPr id="2" name="Title 1"/>
+          <p:cNvSpPr>
+            <a:spLocks noGrp="1"/>
+          </p:cNvSpPr>
+          <p:nvPr>
+            <p:ph type="title"/>
+          </p:nvPr>
+        </p:nvSpPr>
+        <p:spPr/>
+        <p:txBody>
+          <a:bodyPr/>
+          <a:lstStyle/>
+          <a:p>
+            <a:r>
+              <a:rPr lang="en-US" dirty="0"/>
+              <a:t>Explanation</a:t>
+            </a:r>
+          </a:p>
+        </p:txBody>
+      </p:sp>
+      <p:sp>
+        <p:nvSpPr>
+          <p:cNvPr id="3" name="Content Placeholder 2"/>
+          <p:cNvSpPr>
+            <a:spLocks noGrp="1"/>
+          </p:cNvSpPr>
+          <p:nvPr>
+            <p:ph idx="1"/>
+          </p:nvPr>
+        </p:nvSpPr>
+        <p:spPr/>
+        <p:txBody>
+          <a:bodyPr/>
+          <a:lstStyle/>
+          <a:p>
+            <a:r>
+              <a:rPr lang="en-US" dirty="0" smtClean="0"/>
+              <a:t>Pew Research Center conducted the survey in 2016, calling 2,254 people. There are 1,040 observations with 105 variables included in their data set.</a:t>
+            </a:r>
+          </a:p>
+          <a:p>
+            <a:r>
+              <a:rPr lang="en-US" dirty="0" smtClean="0"/>
+              <a:t>Selected this data to learn about survey data focusing on a current issue </a:t>
+            </a:r>
+            <a:r>
+              <a:rPr lang="mr-IN" dirty="0" smtClean="0"/>
+              <a:t>–</a:t>
+            </a:r>
+            <a:r>
+              <a:rPr lang="en-US" dirty="0" smtClean="0"/>
+              <a:t> Cybersecurity.</a:t>
+            </a:r>
+          </a:p>
+          <a:p>
+            <a:r>
+              <a:rPr lang="en-US" dirty="0" smtClean="0"/>
+              <a:t>Many non-responses, N/A and Don’t </a:t>
+            </a:r>
+            <a:r>
+              <a:rPr lang="en-US" dirty="0" err="1" smtClean="0"/>
+              <a:t>Know’s</a:t>
+            </a:r>
+            <a:r>
+              <a:rPr lang="en-US" dirty="0" smtClean="0"/>
+              <a:t> are included.</a:t>
+            </a:r>
+          </a:p>
+          <a:p>
+            <a:r>
+              <a:rPr lang="en-US" dirty="0" smtClean="0"/>
+              <a:t>Categorical, Ordinal, Interval and Numeric data types make the statistical analysis ”interesting”.</a:t>
+            </a:r>
+          </a:p>
+          <a:p>
+            <a:r>
+              <a:rPr lang="en-US" dirty="0" smtClean="0"/>
+              <a:t>Perspective assumed to identify target audience for marketing a new consumer cyber security application.</a:t>
+            </a:r>
+          </a:p>
+          <a:p>
+            <a:endParaRPr lang="en-US" dirty="0" smtClean="0"/>
+          </a:p>
+          <a:p>
+            <a:endParaRPr lang="en-US" dirty="0"/>
+          </a:p>
+        </p:txBody>
+      </p:sp>
+    </p:spTree>
+    <p:extLst>
+      <p:ext uri="{BB962C8B-B14F-4D97-AF65-F5344CB8AC3E}">
+        <p14:creationId xmlns:p14="http://schemas.microsoft.com/office/powerpoint/2010/main" val="1925931884"/>
+      </p:ext>
+    </p:extLst>
+  </p:cSld>
+  <p:clrMapOvr>
+    <a:masterClrMapping/>
+  </p:clrMapOvr>
+</p:sld>
+</file>
+
+<file path=ppt/slides/slide20.xml><?xml version="1.0" encoding="utf-8"?>
 <p:sld xmlns:a="http://schemas.openxmlformats.org/drawingml/2006/main" xmlns:r="http://schemas.openxmlformats.org/officeDocument/2006/relationships" xmlns:p="http://schemas.openxmlformats.org/presentationml/2006/main">
   <p:cSld>
     <p:spTree>
@@ -10480,7 +9210,7 @@
 </p:sld>
 </file>
 
-<file path=ppt/slides/slide24.xml><?xml version="1.0" encoding="utf-8"?>
+<file path=ppt/slides/slide21.xml><?xml version="1.0" encoding="utf-8"?>
 <p:sld xmlns:a="http://schemas.openxmlformats.org/drawingml/2006/main" xmlns:r="http://schemas.openxmlformats.org/officeDocument/2006/relationships" xmlns:p="http://schemas.openxmlformats.org/presentationml/2006/main">
   <p:cSld>
     <p:spTree>
@@ -10933,7 +9663,7 @@
 </p:sld>
 </file>
 
-<file path=ppt/slides/slide25.xml><?xml version="1.0" encoding="utf-8"?>
+<file path=ppt/slides/slide22.xml><?xml version="1.0" encoding="utf-8"?>
 <p:sld xmlns:a="http://schemas.openxmlformats.org/drawingml/2006/main" xmlns:r="http://schemas.openxmlformats.org/officeDocument/2006/relationships" xmlns:p="http://schemas.openxmlformats.org/presentationml/2006/main">
   <p:cSld>
     <p:spTree>
@@ -11390,7 +10120,7 @@
 </p:sld>
 </file>
 
-<file path=ppt/slides/slide26.xml><?xml version="1.0" encoding="utf-8"?>
+<file path=ppt/slides/slide23.xml><?xml version="1.0" encoding="utf-8"?>
 <p:sld xmlns:a="http://schemas.openxmlformats.org/drawingml/2006/main" xmlns:r="http://schemas.openxmlformats.org/officeDocument/2006/relationships" xmlns:p="http://schemas.openxmlformats.org/presentationml/2006/main">
   <p:cSld>
     <p:spTree>
@@ -11851,7 +10581,7 @@
 </p:sld>
 </file>
 
-<file path=ppt/slides/slide27.xml><?xml version="1.0" encoding="utf-8"?>
+<file path=ppt/slides/slide24.xml><?xml version="1.0" encoding="utf-8"?>
 <p:sld xmlns:a="http://schemas.openxmlformats.org/drawingml/2006/main" xmlns:r="http://schemas.openxmlformats.org/officeDocument/2006/relationships" xmlns:p="http://schemas.openxmlformats.org/presentationml/2006/main">
   <p:cSld>
     <p:spTree>
@@ -12330,7 +11060,7 @@
 </p:sld>
 </file>
 
-<file path=ppt/slides/slide28.xml><?xml version="1.0" encoding="utf-8"?>
+<file path=ppt/slides/slide25.xml><?xml version="1.0" encoding="utf-8"?>
 <p:sld xmlns:a="http://schemas.openxmlformats.org/drawingml/2006/main" xmlns:r="http://schemas.openxmlformats.org/officeDocument/2006/relationships" xmlns:p="http://schemas.openxmlformats.org/presentationml/2006/main">
   <p:cSld>
     <p:spTree>
@@ -12526,7 +11256,7 @@
 </p:sld>
 </file>
 
-<file path=ppt/slides/slide29.xml><?xml version="1.0" encoding="utf-8"?>
+<file path=ppt/slides/slide26.xml><?xml version="1.0" encoding="utf-8"?>
 <p:sld xmlns:a="http://schemas.openxmlformats.org/drawingml/2006/main" xmlns:r="http://schemas.openxmlformats.org/officeDocument/2006/relationships" xmlns:p="http://schemas.openxmlformats.org/presentationml/2006/main">
   <p:cSld>
     <p:spTree>
@@ -12722,2493 +11452,7 @@
 </p:sld>
 </file>
 
-<file path=ppt/slides/slide3.xml><?xml version="1.0" encoding="utf-8"?>
-<p:sld xmlns:a="http://schemas.openxmlformats.org/drawingml/2006/main" xmlns:r="http://schemas.openxmlformats.org/officeDocument/2006/relationships" xmlns:p="http://schemas.openxmlformats.org/presentationml/2006/main">
-  <p:cSld>
-    <p:spTree>
-      <p:nvGrpSpPr>
-        <p:cNvPr id="1" name=""/>
-        <p:cNvGrpSpPr/>
-        <p:nvPr/>
-      </p:nvGrpSpPr>
-      <p:grpSpPr>
-        <a:xfrm>
-          <a:off x="0" y="0"/>
-          <a:ext cx="0" cy="0"/>
-          <a:chOff x="0" y="0"/>
-          <a:chExt cx="0" cy="0"/>
-        </a:xfrm>
-      </p:grpSpPr>
-      <p:sp>
-        <p:nvSpPr>
-          <p:cNvPr id="2" name="Title 1"/>
-          <p:cNvSpPr>
-            <a:spLocks noGrp="1"/>
-          </p:cNvSpPr>
-          <p:nvPr>
-            <p:ph type="title"/>
-          </p:nvPr>
-        </p:nvSpPr>
-        <p:spPr/>
-        <p:txBody>
-          <a:bodyPr/>
-          <a:lstStyle/>
-          <a:p>
-            <a:r>
-              <a:rPr lang="en-US" dirty="0" smtClean="0"/>
-              <a:t>Data Issues</a:t>
-            </a:r>
-            <a:endParaRPr lang="en-US" dirty="0"/>
-          </a:p>
-        </p:txBody>
-      </p:sp>
-      <p:sp>
-        <p:nvSpPr>
-          <p:cNvPr id="3" name="Content Placeholder 2"/>
-          <p:cNvSpPr>
-            <a:spLocks noGrp="1"/>
-          </p:cNvSpPr>
-          <p:nvPr>
-            <p:ph idx="1"/>
-          </p:nvPr>
-        </p:nvSpPr>
-        <p:spPr/>
-        <p:txBody>
-          <a:bodyPr/>
-          <a:lstStyle/>
-          <a:p>
-            <a:r>
-              <a:rPr lang="en-US" dirty="0" smtClean="0"/>
-              <a:t>Many Non-Response, NA and Don’t Know responses in the majority of the 105 variables.</a:t>
-            </a:r>
-          </a:p>
-          <a:p>
-            <a:r>
-              <a:rPr lang="en-US" dirty="0" smtClean="0"/>
-              <a:t>105 Variables and 1,040 observations made initial investigation bulky.</a:t>
-            </a:r>
-          </a:p>
-          <a:p>
-            <a:r>
-              <a:rPr lang="en-US" dirty="0" smtClean="0"/>
-              <a:t>Survey data is very interesting, but the limited quantity of numerical and time-related variables reduced types of analytical methods that I wanted to learn.</a:t>
-            </a:r>
-          </a:p>
-          <a:p>
-            <a:r>
-              <a:rPr lang="en-US" dirty="0" smtClean="0"/>
-              <a:t>After several attempts to set up a model, I decided to use the age (</a:t>
-            </a:r>
-            <a:r>
-              <a:rPr lang="en-US" dirty="0" err="1" smtClean="0"/>
-              <a:t>agegroup</a:t>
-            </a:r>
-            <a:r>
-              <a:rPr lang="en-US" dirty="0" smtClean="0"/>
-              <a:t>) as the base variable since it was answered by almost everyone surveyed. </a:t>
-            </a:r>
-            <a:endParaRPr lang="en-US" dirty="0"/>
-          </a:p>
-        </p:txBody>
-      </p:sp>
-    </p:spTree>
-    <p:extLst>
-      <p:ext uri="{BB962C8B-B14F-4D97-AF65-F5344CB8AC3E}">
-        <p14:creationId xmlns:p14="http://schemas.microsoft.com/office/powerpoint/2010/main" val="501460571"/>
-      </p:ext>
-    </p:extLst>
-  </p:cSld>
-  <p:clrMapOvr>
-    <a:masterClrMapping/>
-  </p:clrMapOvr>
-</p:sld>
-</file>
-
-<file path=ppt/slides/slide30.xml><?xml version="1.0" encoding="utf-8"?>
-<p:sld xmlns:a="http://schemas.openxmlformats.org/drawingml/2006/main" xmlns:r="http://schemas.openxmlformats.org/officeDocument/2006/relationships" xmlns:p="http://schemas.openxmlformats.org/presentationml/2006/main">
-  <p:cSld>
-    <p:spTree>
-      <p:nvGrpSpPr>
-        <p:cNvPr id="1" name=""/>
-        <p:cNvGrpSpPr/>
-        <p:nvPr/>
-      </p:nvGrpSpPr>
-      <p:grpSpPr>
-        <a:xfrm>
-          <a:off x="0" y="0"/>
-          <a:ext cx="0" cy="0"/>
-          <a:chOff x="0" y="0"/>
-          <a:chExt cx="0" cy="0"/>
-        </a:xfrm>
-      </p:grpSpPr>
-      <p:sp>
-        <p:nvSpPr>
-          <p:cNvPr id="2" name="Title 1"/>
-          <p:cNvSpPr>
-            <a:spLocks noGrp="1"/>
-          </p:cNvSpPr>
-          <p:nvPr>
-            <p:ph type="title"/>
-          </p:nvPr>
-        </p:nvSpPr>
-        <p:spPr/>
-        <p:txBody>
-          <a:bodyPr>
-            <a:normAutofit fontScale="90000"/>
-          </a:bodyPr>
-          <a:lstStyle/>
-          <a:p>
-            <a:r>
-              <a:rPr lang="en-US" sz="3200" b="1" dirty="0"/>
-              <a:t>Interesting </a:t>
-            </a:r>
-            <a:r>
-              <a:rPr lang="en-US" sz="3200" b="1" dirty="0" smtClean="0"/>
-              <a:t>Findings</a:t>
-            </a:r>
-            <a:br>
-              <a:rPr lang="en-US" sz="3200" b="1" dirty="0" smtClean="0"/>
-            </a:br>
-            <a:r>
-              <a:rPr lang="en-US" sz="3200" b="1" dirty="0"/>
-              <a:t/>
-            </a:r>
-            <a:br>
-              <a:rPr lang="en-US" sz="3200" b="1" dirty="0"/>
-            </a:br>
-            <a:r>
-              <a:rPr lang="en-US" sz="2000" b="1" dirty="0" smtClean="0"/>
-              <a:t>Heat Tables for Variables</a:t>
-            </a:r>
-            <a:br>
-              <a:rPr lang="en-US" sz="2000" b="1" dirty="0" smtClean="0"/>
-            </a:br>
-            <a:r>
-              <a:rPr lang="en-US" sz="2000" b="1" dirty="0" err="1" smtClean="0"/>
-              <a:t>Maritial</a:t>
-            </a:r>
-            <a:r>
-              <a:rPr lang="en-US" sz="2000" b="1" dirty="0" smtClean="0"/>
-              <a:t> Status &amp;</a:t>
-            </a:r>
-            <a:br>
-              <a:rPr lang="en-US" sz="2000" b="1" dirty="0" smtClean="0"/>
-            </a:br>
-            <a:r>
-              <a:rPr lang="en-US" sz="2000" b="1" dirty="0" smtClean="0"/>
-              <a:t>Number of People in Household</a:t>
-            </a:r>
-            <a:r>
-              <a:rPr lang="en-US" sz="2700" dirty="0"/>
-              <a:t/>
-            </a:r>
-            <a:br>
-              <a:rPr lang="en-US" sz="2700" dirty="0"/>
-            </a:br>
-            <a:r>
-              <a:rPr lang="en-US" dirty="0"/>
-              <a:t/>
-            </a:r>
-            <a:br>
-              <a:rPr lang="en-US" dirty="0"/>
-            </a:br>
-            <a:r>
-              <a:rPr lang="en-US" dirty="0"/>
-              <a:t/>
-            </a:r>
-            <a:br>
-              <a:rPr lang="en-US" dirty="0"/>
-            </a:br>
-            <a:r>
-              <a:rPr lang="en-US" dirty="0"/>
-              <a:t/>
-            </a:r>
-            <a:br>
-              <a:rPr lang="en-US" dirty="0"/>
-            </a:br>
-            <a:r>
-              <a:rPr lang="en-US" dirty="0"/>
-              <a:t/>
-            </a:r>
-            <a:br>
-              <a:rPr lang="en-US" dirty="0"/>
-            </a:br>
-            <a:r>
-              <a:rPr lang="en-US" sz="2000" dirty="0"/>
-              <a:t/>
-            </a:r>
-            <a:br>
-              <a:rPr lang="en-US" sz="2000" dirty="0"/>
-            </a:br>
-            <a:endParaRPr lang="en-US" sz="2000" dirty="0"/>
-          </a:p>
-        </p:txBody>
-      </p:sp>
-      <p:pic>
-        <p:nvPicPr>
-          <p:cNvPr id="4" name="Content Placeholder 3"/>
-          <p:cNvPicPr>
-            <a:picLocks noGrp="1" noChangeAspect="1"/>
-          </p:cNvPicPr>
-          <p:nvPr>
-            <p:ph sz="half" idx="2"/>
-          </p:nvPr>
-        </p:nvPicPr>
-        <p:blipFill>
-          <a:blip r:embed="rId2">
-            <a:extLst>
-              <a:ext uri="{28A0092B-C50C-407E-A947-70E740481C1C}">
-                <a14:useLocalDpi xmlns:a14="http://schemas.microsoft.com/office/drawing/2010/main" val="0"/>
-              </a:ext>
-            </a:extLst>
-          </a:blip>
-          <a:stretch>
-            <a:fillRect/>
-          </a:stretch>
-        </p:blipFill>
-        <p:spPr>
-          <a:xfrm>
-            <a:off x="3867150" y="3644209"/>
-            <a:ext cx="3475038" cy="2440335"/>
-          </a:xfrm>
-        </p:spPr>
-      </p:pic>
-      <p:sp>
-        <p:nvSpPr>
-          <p:cNvPr id="11" name="Text Placeholder 10"/>
-          <p:cNvSpPr>
-            <a:spLocks noGrp="1"/>
-          </p:cNvSpPr>
-          <p:nvPr>
-            <p:ph type="body" sz="quarter" idx="3"/>
-          </p:nvPr>
-        </p:nvSpPr>
-        <p:spPr>
-          <a:xfrm>
-            <a:off x="7818463" y="540774"/>
-            <a:ext cx="3474720" cy="5338916"/>
-          </a:xfrm>
-        </p:spPr>
-        <p:txBody>
-          <a:bodyPr>
-            <a:normAutofit lnSpcReduction="10000"/>
-          </a:bodyPr>
-          <a:lstStyle/>
-          <a:p>
-            <a:pPr marL="342900" indent="-342900">
-              <a:buFont typeface="Arial" charset="0"/>
-              <a:buChar char="•"/>
-            </a:pPr>
-            <a:endParaRPr lang="en-US" dirty="0"/>
-          </a:p>
-          <a:p>
-            <a:pPr marL="342900" indent="-342900">
-              <a:buFont typeface="Arial" charset="0"/>
-              <a:buChar char="•"/>
-            </a:pPr>
-            <a:endParaRPr lang="en-US" dirty="0" smtClean="0"/>
-          </a:p>
-          <a:p>
-            <a:pPr marL="342900" indent="-342900">
-              <a:buFont typeface="Arial" charset="0"/>
-              <a:buChar char="•"/>
-            </a:pPr>
-            <a:r>
-              <a:rPr lang="en-US" b="0" dirty="0" smtClean="0"/>
-              <a:t>26% - </a:t>
-            </a:r>
-            <a:r>
-              <a:rPr lang="en-US" b="0" dirty="0" err="1" smtClean="0"/>
-              <a:t>Millenials</a:t>
-            </a:r>
-            <a:endParaRPr lang="en-US" b="0" dirty="0" smtClean="0"/>
-          </a:p>
-          <a:p>
-            <a:pPr marL="342900" indent="-342900">
-              <a:buFont typeface="Arial" charset="0"/>
-              <a:buChar char="•"/>
-            </a:pPr>
-            <a:r>
-              <a:rPr lang="en-US" b="0" dirty="0" smtClean="0"/>
-              <a:t>23% - Gen-</a:t>
-            </a:r>
-            <a:r>
-              <a:rPr lang="en-US" b="0" dirty="0" err="1" smtClean="0"/>
-              <a:t>X’ers</a:t>
-            </a:r>
-            <a:endParaRPr lang="en-US" b="0" dirty="0" smtClean="0"/>
-          </a:p>
-          <a:p>
-            <a:pPr marL="342900" indent="-342900">
-              <a:buFont typeface="Arial" charset="0"/>
-              <a:buChar char="•"/>
-            </a:pPr>
-            <a:r>
-              <a:rPr lang="en-US" b="0" dirty="0" smtClean="0"/>
-              <a:t>22% - Young Boomers</a:t>
-            </a:r>
-          </a:p>
-          <a:p>
-            <a:pPr marL="342900" indent="-342900">
-              <a:buFont typeface="Arial" charset="0"/>
-              <a:buChar char="•"/>
-            </a:pPr>
-            <a:r>
-              <a:rPr lang="en-US" b="0" dirty="0" smtClean="0"/>
-              <a:t>13% - Old Boomers</a:t>
-            </a:r>
-          </a:p>
-          <a:p>
-            <a:pPr marL="342900" indent="-342900">
-              <a:buFont typeface="Arial" charset="0"/>
-              <a:buChar char="•"/>
-            </a:pPr>
-            <a:r>
-              <a:rPr lang="en-US" b="0" dirty="0" smtClean="0"/>
-              <a:t>9% - Silent Generation</a:t>
-            </a:r>
-          </a:p>
-          <a:p>
-            <a:pPr marL="342900" indent="-342900">
-              <a:buFont typeface="Arial" charset="0"/>
-              <a:buChar char="•"/>
-            </a:pPr>
-            <a:r>
-              <a:rPr lang="en-US" b="0" dirty="0" smtClean="0"/>
-              <a:t>4% - GI Generation</a:t>
-            </a:r>
-          </a:p>
-          <a:p>
-            <a:pPr marL="342900" indent="-342900">
-              <a:buFont typeface="Arial" charset="0"/>
-              <a:buChar char="•"/>
-            </a:pPr>
-            <a:r>
-              <a:rPr lang="en-US" b="0" dirty="0"/>
-              <a:t>50.4% of the responders are married.</a:t>
-            </a:r>
-          </a:p>
-          <a:p>
-            <a:pPr marL="342900" indent="-342900">
-              <a:buFont typeface="Arial" charset="0"/>
-              <a:buChar char="•"/>
-            </a:pPr>
-            <a:r>
-              <a:rPr lang="en-US" b="0" dirty="0"/>
-              <a:t> 13.2% of the responders are </a:t>
-            </a:r>
-            <a:r>
-              <a:rPr lang="en-US" b="0" dirty="0" err="1"/>
-              <a:t>Millenials</a:t>
-            </a:r>
-            <a:r>
-              <a:rPr lang="en-US" b="0" dirty="0"/>
-              <a:t> that have never been married.</a:t>
-            </a:r>
-          </a:p>
-          <a:p>
-            <a:pPr marL="342900" indent="-342900">
-              <a:buFont typeface="Arial" charset="0"/>
-              <a:buChar char="•"/>
-            </a:pPr>
-            <a:endParaRPr lang="en-US" b="0" dirty="0" smtClean="0"/>
-          </a:p>
-          <a:p>
-            <a:pPr marL="342900" indent="-342900">
-              <a:buFont typeface="Arial" charset="0"/>
-              <a:buChar char="•"/>
-            </a:pPr>
-            <a:endParaRPr lang="en-US" b="0" dirty="0"/>
-          </a:p>
-          <a:p>
-            <a:pPr marL="342900" indent="-342900">
-              <a:buFont typeface="Arial" charset="0"/>
-              <a:buChar char="•"/>
-            </a:pPr>
-            <a:endParaRPr lang="en-US" b="0" dirty="0" smtClean="0"/>
-          </a:p>
-          <a:p>
-            <a:pPr marL="342900" indent="-342900">
-              <a:buFont typeface="Arial" charset="0"/>
-              <a:buChar char="•"/>
-            </a:pPr>
-            <a:r>
-              <a:rPr lang="en-US" b="0" dirty="0" smtClean="0"/>
-              <a:t>33.85% have 2 people in their household.</a:t>
-            </a:r>
-          </a:p>
-          <a:p>
-            <a:pPr marL="342900" indent="-342900">
-              <a:buFont typeface="Arial" charset="0"/>
-              <a:buChar char="•"/>
-            </a:pPr>
-            <a:r>
-              <a:rPr lang="en-US" b="0" dirty="0" smtClean="0"/>
-              <a:t>~2% did not respond to either question.</a:t>
-            </a:r>
-          </a:p>
-          <a:p>
-            <a:pPr marL="342900" indent="-342900">
-              <a:buFont typeface="Arial" charset="0"/>
-              <a:buChar char="•"/>
-            </a:pPr>
-            <a:endParaRPr lang="en-US" dirty="0"/>
-          </a:p>
-        </p:txBody>
-      </p:sp>
-      <p:pic>
-        <p:nvPicPr>
-          <p:cNvPr id="3" name="Content Placeholder 2"/>
-          <p:cNvPicPr>
-            <a:picLocks noGrp="1" noChangeAspect="1"/>
-          </p:cNvPicPr>
-          <p:nvPr>
-            <p:ph sz="quarter" idx="4"/>
-          </p:nvPr>
-        </p:nvPicPr>
-        <p:blipFill>
-          <a:blip r:embed="rId3">
-            <a:extLst>
-              <a:ext uri="{28A0092B-C50C-407E-A947-70E740481C1C}">
-                <a14:useLocalDpi xmlns:a14="http://schemas.microsoft.com/office/drawing/2010/main" val="0"/>
-              </a:ext>
-            </a:extLst>
-          </a:blip>
-          <a:stretch>
-            <a:fillRect/>
-          </a:stretch>
-        </p:blipFill>
-        <p:spPr>
-          <a:xfrm>
-            <a:off x="3905193" y="729472"/>
-            <a:ext cx="3475037" cy="2748909"/>
-          </a:xfrm>
-        </p:spPr>
-      </p:pic>
-    </p:spTree>
-    <p:extLst>
-      <p:ext uri="{BB962C8B-B14F-4D97-AF65-F5344CB8AC3E}">
-        <p14:creationId xmlns:p14="http://schemas.microsoft.com/office/powerpoint/2010/main" val="74100106"/>
-      </p:ext>
-    </p:extLst>
-  </p:cSld>
-  <p:clrMapOvr>
-    <a:masterClrMapping/>
-  </p:clrMapOvr>
-</p:sld>
-</file>
-
-<file path=ppt/slides/slide31.xml><?xml version="1.0" encoding="utf-8"?>
-<p:sld xmlns:a="http://schemas.openxmlformats.org/drawingml/2006/main" xmlns:r="http://schemas.openxmlformats.org/officeDocument/2006/relationships" xmlns:p="http://schemas.openxmlformats.org/presentationml/2006/main">
-  <p:cSld>
-    <p:spTree>
-      <p:nvGrpSpPr>
-        <p:cNvPr id="1" name=""/>
-        <p:cNvGrpSpPr/>
-        <p:nvPr/>
-      </p:nvGrpSpPr>
-      <p:grpSpPr>
-        <a:xfrm>
-          <a:off x="0" y="0"/>
-          <a:ext cx="0" cy="0"/>
-          <a:chOff x="0" y="0"/>
-          <a:chExt cx="0" cy="0"/>
-        </a:xfrm>
-      </p:grpSpPr>
-      <p:sp>
-        <p:nvSpPr>
-          <p:cNvPr id="2" name="Title 1"/>
-          <p:cNvSpPr>
-            <a:spLocks noGrp="1"/>
-          </p:cNvSpPr>
-          <p:nvPr>
-            <p:ph type="title"/>
-          </p:nvPr>
-        </p:nvSpPr>
-        <p:spPr/>
-        <p:txBody>
-          <a:bodyPr>
-            <a:normAutofit fontScale="90000"/>
-          </a:bodyPr>
-          <a:lstStyle/>
-          <a:p>
-            <a:r>
-              <a:rPr lang="en-US" sz="3200" b="1" dirty="0"/>
-              <a:t>Interesting </a:t>
-            </a:r>
-            <a:r>
-              <a:rPr lang="en-US" sz="3200" b="1" dirty="0" smtClean="0"/>
-              <a:t>Findings</a:t>
-            </a:r>
-            <a:br>
-              <a:rPr lang="en-US" sz="3200" b="1" dirty="0" smtClean="0"/>
-            </a:br>
-            <a:r>
-              <a:rPr lang="en-US" sz="3200" b="1" dirty="0"/>
-              <a:t/>
-            </a:r>
-            <a:br>
-              <a:rPr lang="en-US" sz="3200" b="1" dirty="0"/>
-            </a:br>
-            <a:r>
-              <a:rPr lang="en-US" sz="2000" b="1" dirty="0" smtClean="0"/>
-              <a:t>Heat Tables for Variables</a:t>
-            </a:r>
-            <a:br>
-              <a:rPr lang="en-US" sz="2000" b="1" dirty="0" smtClean="0"/>
-            </a:br>
-            <a:r>
-              <a:rPr lang="en-US" sz="2000" b="1" dirty="0" smtClean="0"/>
-              <a:t>Land Line Working in Household &amp; Internet Usage Frequency</a:t>
-            </a:r>
-            <a:r>
-              <a:rPr lang="en-US" sz="2700" dirty="0"/>
-              <a:t/>
-            </a:r>
-            <a:br>
-              <a:rPr lang="en-US" sz="2700" dirty="0"/>
-            </a:br>
-            <a:r>
-              <a:rPr lang="en-US" dirty="0"/>
-              <a:t/>
-            </a:r>
-            <a:br>
-              <a:rPr lang="en-US" dirty="0"/>
-            </a:br>
-            <a:r>
-              <a:rPr lang="en-US" dirty="0"/>
-              <a:t/>
-            </a:r>
-            <a:br>
-              <a:rPr lang="en-US" dirty="0"/>
-            </a:br>
-            <a:r>
-              <a:rPr lang="en-US" dirty="0"/>
-              <a:t/>
-            </a:r>
-            <a:br>
-              <a:rPr lang="en-US" dirty="0"/>
-            </a:br>
-            <a:r>
-              <a:rPr lang="en-US" dirty="0"/>
-              <a:t/>
-            </a:r>
-            <a:br>
-              <a:rPr lang="en-US" dirty="0"/>
-            </a:br>
-            <a:r>
-              <a:rPr lang="en-US" sz="2000" dirty="0"/>
-              <a:t/>
-            </a:r>
-            <a:br>
-              <a:rPr lang="en-US" sz="2000" dirty="0"/>
-            </a:br>
-            <a:endParaRPr lang="en-US" sz="2000" dirty="0"/>
-          </a:p>
-        </p:txBody>
-      </p:sp>
-      <p:sp>
-        <p:nvSpPr>
-          <p:cNvPr id="11" name="Text Placeholder 10"/>
-          <p:cNvSpPr>
-            <a:spLocks noGrp="1"/>
-          </p:cNvSpPr>
-          <p:nvPr>
-            <p:ph type="body" sz="quarter" idx="3"/>
-          </p:nvPr>
-        </p:nvSpPr>
-        <p:spPr>
-          <a:xfrm>
-            <a:off x="7818463" y="729472"/>
-            <a:ext cx="3474720" cy="5355072"/>
-          </a:xfrm>
-        </p:spPr>
-        <p:txBody>
-          <a:bodyPr>
-            <a:normAutofit lnSpcReduction="10000"/>
-          </a:bodyPr>
-          <a:lstStyle/>
-          <a:p>
-            <a:pPr marL="342900" indent="-342900">
-              <a:buFont typeface="Arial" charset="0"/>
-              <a:buChar char="•"/>
-            </a:pPr>
-            <a:endParaRPr lang="en-US" dirty="0"/>
-          </a:p>
-          <a:p>
-            <a:pPr marL="342900" indent="-342900">
-              <a:buFont typeface="Arial" charset="0"/>
-              <a:buChar char="•"/>
-            </a:pPr>
-            <a:endParaRPr lang="en-US" dirty="0" smtClean="0"/>
-          </a:p>
-          <a:p>
-            <a:pPr marL="342900" indent="-342900">
-              <a:buFont typeface="Arial" charset="0"/>
-              <a:buChar char="•"/>
-            </a:pPr>
-            <a:r>
-              <a:rPr lang="en-US" b="0" dirty="0" smtClean="0"/>
-              <a:t>45.3% do not have a working land line in their home, with the </a:t>
-            </a:r>
-            <a:r>
-              <a:rPr lang="en-US" b="0" dirty="0" err="1" smtClean="0"/>
-              <a:t>Millenials</a:t>
-            </a:r>
-            <a:r>
-              <a:rPr lang="en-US" b="0" dirty="0" smtClean="0"/>
-              <a:t> leading the way.</a:t>
-            </a:r>
-          </a:p>
-          <a:p>
-            <a:pPr marL="342900" indent="-342900">
-              <a:buFont typeface="Arial" charset="0"/>
-              <a:buChar char="•"/>
-            </a:pPr>
-            <a:r>
-              <a:rPr lang="en-US" b="0" dirty="0" smtClean="0"/>
-              <a:t>25.7% did not respond to the land line question.</a:t>
-            </a:r>
-          </a:p>
-          <a:p>
-            <a:pPr marL="342900" indent="-342900">
-              <a:buFont typeface="Arial" charset="0"/>
-              <a:buChar char="•"/>
-            </a:pPr>
-            <a:endParaRPr lang="en-US" b="0" dirty="0" smtClean="0"/>
-          </a:p>
-          <a:p>
-            <a:pPr marL="342900" indent="-342900">
-              <a:buFont typeface="Arial" charset="0"/>
-              <a:buChar char="•"/>
-            </a:pPr>
-            <a:endParaRPr lang="en-US" b="0" dirty="0"/>
-          </a:p>
-          <a:p>
-            <a:pPr marL="342900" indent="-342900">
-              <a:buFont typeface="Arial" charset="0"/>
-              <a:buChar char="•"/>
-            </a:pPr>
-            <a:endParaRPr lang="en-US" b="0" dirty="0" smtClean="0"/>
-          </a:p>
-          <a:p>
-            <a:pPr marL="342900" indent="-342900">
-              <a:buFont typeface="Arial" charset="0"/>
-              <a:buChar char="•"/>
-            </a:pPr>
-            <a:r>
-              <a:rPr lang="en-US" b="0" dirty="0" smtClean="0"/>
-              <a:t>44.9% use the internet several times per day.</a:t>
-            </a:r>
-          </a:p>
-          <a:p>
-            <a:pPr marL="342900" indent="-342900">
-              <a:buFont typeface="Arial" charset="0"/>
-              <a:buChar char="•"/>
-            </a:pPr>
-            <a:r>
-              <a:rPr lang="en-US" b="0" dirty="0" smtClean="0"/>
-              <a:t>51% of </a:t>
-            </a:r>
-            <a:r>
-              <a:rPr lang="en-US" b="0" dirty="0" err="1" smtClean="0"/>
-              <a:t>Millenials</a:t>
-            </a:r>
-            <a:r>
-              <a:rPr lang="en-US" b="0" dirty="0" smtClean="0"/>
-              <a:t>, 50% Gen-X, 43%  Young Boomers, 47% Old Boomers, 36% Silent Gen and 10% GI Gen check several times per day.</a:t>
-            </a:r>
-          </a:p>
-          <a:p>
-            <a:pPr marL="342900" indent="-342900">
-              <a:buFont typeface="Arial" charset="0"/>
-              <a:buChar char="•"/>
-            </a:pPr>
-            <a:r>
-              <a:rPr lang="en-US" b="0" dirty="0" smtClean="0"/>
-              <a:t>11.4% did not respond to the internet frequency question.</a:t>
-            </a:r>
-          </a:p>
-          <a:p>
-            <a:pPr marL="342900" indent="-342900">
-              <a:buFont typeface="Arial" charset="0"/>
-              <a:buChar char="•"/>
-            </a:pPr>
-            <a:endParaRPr lang="en-US" dirty="0"/>
-          </a:p>
-        </p:txBody>
-      </p:sp>
-      <p:pic>
-        <p:nvPicPr>
-          <p:cNvPr id="8" name="Content Placeholder 7"/>
-          <p:cNvPicPr>
-            <a:picLocks noGrp="1" noChangeAspect="1"/>
-          </p:cNvPicPr>
-          <p:nvPr>
-            <p:ph sz="quarter" idx="4"/>
-          </p:nvPr>
-        </p:nvPicPr>
-        <p:blipFill>
-          <a:blip r:embed="rId2">
-            <a:extLst>
-              <a:ext uri="{28A0092B-C50C-407E-A947-70E740481C1C}">
-                <a14:useLocalDpi xmlns:a14="http://schemas.microsoft.com/office/drawing/2010/main" val="0"/>
-              </a:ext>
-            </a:extLst>
-          </a:blip>
-          <a:stretch>
-            <a:fillRect/>
-          </a:stretch>
-        </p:blipFill>
-        <p:spPr>
-          <a:xfrm>
-            <a:off x="4218039" y="3696930"/>
-            <a:ext cx="2897930" cy="2387614"/>
-          </a:xfrm>
-        </p:spPr>
-      </p:pic>
-      <p:pic>
-        <p:nvPicPr>
-          <p:cNvPr id="7" name="Content Placeholder 6"/>
-          <p:cNvPicPr>
-            <a:picLocks noGrp="1" noChangeAspect="1"/>
-          </p:cNvPicPr>
-          <p:nvPr>
-            <p:ph sz="half" idx="2"/>
-          </p:nvPr>
-        </p:nvPicPr>
-        <p:blipFill>
-          <a:blip r:embed="rId3">
-            <a:extLst>
-              <a:ext uri="{28A0092B-C50C-407E-A947-70E740481C1C}">
-                <a14:useLocalDpi xmlns:a14="http://schemas.microsoft.com/office/drawing/2010/main" val="0"/>
-              </a:ext>
-            </a:extLst>
-          </a:blip>
-          <a:stretch>
-            <a:fillRect/>
-          </a:stretch>
-        </p:blipFill>
-        <p:spPr>
-          <a:xfrm>
-            <a:off x="4218039" y="612432"/>
-            <a:ext cx="2897930" cy="3005840"/>
-          </a:xfrm>
-        </p:spPr>
-      </p:pic>
-    </p:spTree>
-    <p:extLst>
-      <p:ext uri="{BB962C8B-B14F-4D97-AF65-F5344CB8AC3E}">
-        <p14:creationId xmlns:p14="http://schemas.microsoft.com/office/powerpoint/2010/main" val="1782965044"/>
-      </p:ext>
-    </p:extLst>
-  </p:cSld>
-  <p:clrMapOvr>
-    <a:masterClrMapping/>
-  </p:clrMapOvr>
-</p:sld>
-</file>
-
-<file path=ppt/slides/slide32.xml><?xml version="1.0" encoding="utf-8"?>
-<p:sld xmlns:a="http://schemas.openxmlformats.org/drawingml/2006/main" xmlns:r="http://schemas.openxmlformats.org/officeDocument/2006/relationships" xmlns:p="http://schemas.openxmlformats.org/presentationml/2006/main">
-  <p:cSld>
-    <p:spTree>
-      <p:nvGrpSpPr>
-        <p:cNvPr id="1" name=""/>
-        <p:cNvGrpSpPr/>
-        <p:nvPr/>
-      </p:nvGrpSpPr>
-      <p:grpSpPr>
-        <a:xfrm>
-          <a:off x="0" y="0"/>
-          <a:ext cx="0" cy="0"/>
-          <a:chOff x="0" y="0"/>
-          <a:chExt cx="0" cy="0"/>
-        </a:xfrm>
-      </p:grpSpPr>
-      <p:sp>
-        <p:nvSpPr>
-          <p:cNvPr id="2" name="Title 1"/>
-          <p:cNvSpPr>
-            <a:spLocks noGrp="1"/>
-          </p:cNvSpPr>
-          <p:nvPr>
-            <p:ph type="title"/>
-          </p:nvPr>
-        </p:nvSpPr>
-        <p:spPr/>
-        <p:txBody>
-          <a:bodyPr>
-            <a:normAutofit/>
-          </a:bodyPr>
-          <a:lstStyle/>
-          <a:p>
-            <a:r>
-              <a:rPr lang="en-US" sz="3200" b="1" dirty="0"/>
-              <a:t>Interesting </a:t>
-            </a:r>
-            <a:r>
-              <a:rPr lang="en-US" sz="3200" b="1" dirty="0" smtClean="0"/>
-              <a:t>Findings</a:t>
-            </a:r>
-            <a:br>
-              <a:rPr lang="en-US" sz="3200" b="1" dirty="0" smtClean="0"/>
-            </a:br>
-            <a:r>
-              <a:rPr lang="en-US" sz="3200" b="1" dirty="0"/>
-              <a:t/>
-            </a:r>
-            <a:br>
-              <a:rPr lang="en-US" sz="3200" b="1" dirty="0"/>
-            </a:br>
-            <a:r>
-              <a:rPr lang="en-US" sz="2000" b="1" dirty="0" smtClean="0"/>
-              <a:t>Heat Tables for Variables</a:t>
-            </a:r>
-            <a:br>
-              <a:rPr lang="en-US" sz="2000" b="1" dirty="0" smtClean="0"/>
-            </a:br>
-            <a:r>
-              <a:rPr lang="en-US" sz="2000" b="1" dirty="0" smtClean="0"/>
-              <a:t/>
-            </a:r>
-            <a:br>
-              <a:rPr lang="en-US" sz="2000" b="1" dirty="0" smtClean="0"/>
-            </a:br>
-            <a:r>
-              <a:rPr lang="en-US" sz="2000" b="1" dirty="0" smtClean="0"/>
-              <a:t>Password Management &amp; Similarity of Passwords</a:t>
-            </a:r>
-            <a:r>
-              <a:rPr lang="en-US" dirty="0"/>
-              <a:t/>
-            </a:r>
-            <a:br>
-              <a:rPr lang="en-US" dirty="0"/>
-            </a:br>
-            <a:r>
-              <a:rPr lang="en-US" dirty="0"/>
-              <a:t/>
-            </a:r>
-            <a:br>
-              <a:rPr lang="en-US" dirty="0"/>
-            </a:br>
-            <a:r>
-              <a:rPr lang="en-US" dirty="0"/>
-              <a:t/>
-            </a:r>
-            <a:br>
-              <a:rPr lang="en-US" dirty="0"/>
-            </a:br>
-            <a:r>
-              <a:rPr lang="en-US" dirty="0"/>
-              <a:t/>
-            </a:r>
-            <a:br>
-              <a:rPr lang="en-US" dirty="0"/>
-            </a:br>
-            <a:r>
-              <a:rPr lang="en-US" sz="2000" dirty="0"/>
-              <a:t/>
-            </a:r>
-            <a:br>
-              <a:rPr lang="en-US" sz="2000" dirty="0"/>
-            </a:br>
-            <a:endParaRPr lang="en-US" sz="2000" dirty="0"/>
-          </a:p>
-        </p:txBody>
-      </p:sp>
-      <p:sp>
-        <p:nvSpPr>
-          <p:cNvPr id="11" name="Text Placeholder 10"/>
-          <p:cNvSpPr>
-            <a:spLocks noGrp="1"/>
-          </p:cNvSpPr>
-          <p:nvPr>
-            <p:ph type="body" sz="quarter" idx="3"/>
-          </p:nvPr>
-        </p:nvSpPr>
-        <p:spPr>
-          <a:xfrm>
-            <a:off x="7818463" y="363794"/>
-            <a:ext cx="3474720" cy="5594554"/>
-          </a:xfrm>
-        </p:spPr>
-        <p:txBody>
-          <a:bodyPr>
-            <a:normAutofit fontScale="92500" lnSpcReduction="10000"/>
-          </a:bodyPr>
-          <a:lstStyle/>
-          <a:p>
-            <a:pPr marL="342900" indent="-342900">
-              <a:buFont typeface="Arial" charset="0"/>
-              <a:buChar char="•"/>
-            </a:pPr>
-            <a:endParaRPr lang="en-US" dirty="0" smtClean="0"/>
-          </a:p>
-          <a:p>
-            <a:pPr marL="342900" indent="-342900">
-              <a:buFont typeface="Arial" charset="0"/>
-              <a:buChar char="•"/>
-            </a:pPr>
-            <a:r>
-              <a:rPr lang="en-US" b="0" dirty="0" smtClean="0"/>
-              <a:t>44.8% did not respond to how they manage their passwords (#1 Response)</a:t>
-            </a:r>
-          </a:p>
-          <a:p>
-            <a:pPr marL="342900" indent="-342900">
-              <a:buFont typeface="Arial" charset="0"/>
-              <a:buChar char="•"/>
-            </a:pPr>
-            <a:r>
-              <a:rPr lang="en-US" b="0" dirty="0" smtClean="0"/>
-              <a:t>32.2% memorize their passwords.</a:t>
-            </a:r>
-          </a:p>
-          <a:p>
-            <a:pPr marL="342900" indent="-342900">
-              <a:buFont typeface="Arial" charset="0"/>
-              <a:buChar char="•"/>
-            </a:pPr>
-            <a:r>
-              <a:rPr lang="en-US" b="0" dirty="0" smtClean="0"/>
-              <a:t>11.3% write their passwords on a piece of paper.</a:t>
-            </a:r>
-          </a:p>
-          <a:p>
-            <a:pPr marL="342900" indent="-342900">
-              <a:buFont typeface="Arial" charset="0"/>
-              <a:buChar char="•"/>
-            </a:pPr>
-            <a:r>
-              <a:rPr lang="en-US" b="0" dirty="0" smtClean="0"/>
-              <a:t>3.1% use a password management program</a:t>
-            </a:r>
-          </a:p>
-          <a:p>
-            <a:pPr marL="342900" indent="-342900">
-              <a:buFont typeface="Arial" charset="0"/>
-              <a:buChar char="•"/>
-            </a:pPr>
-            <a:endParaRPr lang="en-US" b="0" dirty="0"/>
-          </a:p>
-          <a:p>
-            <a:pPr marL="342900" indent="-342900">
-              <a:buFont typeface="Arial" charset="0"/>
-              <a:buChar char="•"/>
-            </a:pPr>
-            <a:endParaRPr lang="en-US" b="0" dirty="0" smtClean="0"/>
-          </a:p>
-          <a:p>
-            <a:pPr marL="342900" indent="-342900">
-              <a:buFont typeface="Arial" charset="0"/>
-              <a:buChar char="•"/>
-            </a:pPr>
-            <a:endParaRPr lang="en-US" b="0" dirty="0"/>
-          </a:p>
-          <a:p>
-            <a:pPr marL="342900" indent="-342900">
-              <a:buFont typeface="Arial" charset="0"/>
-              <a:buChar char="•"/>
-            </a:pPr>
-            <a:endParaRPr lang="en-US" b="0" dirty="0" smtClean="0"/>
-          </a:p>
-          <a:p>
-            <a:pPr marL="342900" indent="-342900">
-              <a:buFont typeface="Arial" charset="0"/>
-              <a:buChar char="•"/>
-            </a:pPr>
-            <a:endParaRPr lang="en-US" b="0" dirty="0" smtClean="0"/>
-          </a:p>
-          <a:p>
-            <a:pPr marL="342900" indent="-342900">
-              <a:buFont typeface="Arial" charset="0"/>
-              <a:buChar char="•"/>
-            </a:pPr>
-            <a:endParaRPr lang="en-US" b="0" dirty="0" smtClean="0"/>
-          </a:p>
-          <a:p>
-            <a:pPr marL="342900" indent="-342900">
-              <a:buFont typeface="Arial" charset="0"/>
-              <a:buChar char="•"/>
-            </a:pPr>
-            <a:r>
-              <a:rPr lang="en-US" b="0" dirty="0" smtClean="0"/>
-              <a:t>52.3% use very different passwords for various accounts</a:t>
-            </a:r>
-          </a:p>
-          <a:p>
-            <a:pPr marL="342900" indent="-342900">
-              <a:buFont typeface="Arial" charset="0"/>
-              <a:buChar char="•"/>
-            </a:pPr>
-            <a:r>
-              <a:rPr lang="en-US" b="0" dirty="0" smtClean="0"/>
-              <a:t>33.5% use very similar passwords</a:t>
-            </a:r>
-          </a:p>
-          <a:p>
-            <a:pPr marL="342900" indent="-342900">
-              <a:buFont typeface="Arial" charset="0"/>
-              <a:buChar char="•"/>
-            </a:pPr>
-            <a:r>
-              <a:rPr lang="en-US" b="0" dirty="0" smtClean="0"/>
-              <a:t>13.2% did not respond to the question</a:t>
-            </a:r>
-            <a:endParaRPr lang="en-US" b="0" dirty="0"/>
-          </a:p>
-        </p:txBody>
-      </p:sp>
-      <p:pic>
-        <p:nvPicPr>
-          <p:cNvPr id="5" name="Content Placeholder 4"/>
-          <p:cNvPicPr>
-            <a:picLocks noGrp="1" noChangeAspect="1"/>
-          </p:cNvPicPr>
-          <p:nvPr>
-            <p:ph sz="quarter" idx="4"/>
-          </p:nvPr>
-        </p:nvPicPr>
-        <p:blipFill>
-          <a:blip r:embed="rId3">
-            <a:extLst>
-              <a:ext uri="{28A0092B-C50C-407E-A947-70E740481C1C}">
-                <a14:useLocalDpi xmlns:a14="http://schemas.microsoft.com/office/drawing/2010/main" val="0"/>
-              </a:ext>
-            </a:extLst>
-          </a:blip>
-          <a:stretch>
-            <a:fillRect/>
-          </a:stretch>
-        </p:blipFill>
-        <p:spPr>
-          <a:xfrm>
-            <a:off x="3771913" y="658916"/>
-            <a:ext cx="3475037" cy="2496727"/>
-          </a:xfrm>
-        </p:spPr>
-      </p:pic>
-      <p:pic>
-        <p:nvPicPr>
-          <p:cNvPr id="6" name="Picture 5"/>
-          <p:cNvPicPr>
-            <a:picLocks noChangeAspect="1"/>
-          </p:cNvPicPr>
-          <p:nvPr/>
-        </p:nvPicPr>
-        <p:blipFill>
-          <a:blip r:embed="rId4">
-            <a:extLst>
-              <a:ext uri="{28A0092B-C50C-407E-A947-70E740481C1C}">
-                <a14:useLocalDpi xmlns:a14="http://schemas.microsoft.com/office/drawing/2010/main" val="0"/>
-              </a:ext>
-            </a:extLst>
-          </a:blip>
-          <a:stretch>
-            <a:fillRect/>
-          </a:stretch>
-        </p:blipFill>
-        <p:spPr>
-          <a:xfrm>
-            <a:off x="3771912" y="3155643"/>
-            <a:ext cx="3475037" cy="2933700"/>
-          </a:xfrm>
-          <a:prstGeom prst="rect">
-            <a:avLst/>
-          </a:prstGeom>
-        </p:spPr>
-      </p:pic>
-    </p:spTree>
-    <p:extLst>
-      <p:ext uri="{BB962C8B-B14F-4D97-AF65-F5344CB8AC3E}">
-        <p14:creationId xmlns:p14="http://schemas.microsoft.com/office/powerpoint/2010/main" val="1086085610"/>
-      </p:ext>
-    </p:extLst>
-  </p:cSld>
-  <p:clrMapOvr>
-    <a:masterClrMapping/>
-  </p:clrMapOvr>
-</p:sld>
-</file>
-
-<file path=ppt/slides/slide33.xml><?xml version="1.0" encoding="utf-8"?>
-<p:sld xmlns:a="http://schemas.openxmlformats.org/drawingml/2006/main" xmlns:r="http://schemas.openxmlformats.org/officeDocument/2006/relationships" xmlns:p="http://schemas.openxmlformats.org/presentationml/2006/main">
-  <p:cSld>
-    <p:spTree>
-      <p:nvGrpSpPr>
-        <p:cNvPr id="1" name=""/>
-        <p:cNvGrpSpPr/>
-        <p:nvPr/>
-      </p:nvGrpSpPr>
-      <p:grpSpPr>
-        <a:xfrm>
-          <a:off x="0" y="0"/>
-          <a:ext cx="0" cy="0"/>
-          <a:chOff x="0" y="0"/>
-          <a:chExt cx="0" cy="0"/>
-        </a:xfrm>
-      </p:grpSpPr>
-      <p:sp>
-        <p:nvSpPr>
-          <p:cNvPr id="2" name="Title 1"/>
-          <p:cNvSpPr>
-            <a:spLocks noGrp="1"/>
-          </p:cNvSpPr>
-          <p:nvPr>
-            <p:ph type="title"/>
-          </p:nvPr>
-        </p:nvSpPr>
-        <p:spPr/>
-        <p:txBody>
-          <a:bodyPr>
-            <a:normAutofit fontScale="90000"/>
-          </a:bodyPr>
-          <a:lstStyle/>
-          <a:p>
-            <a:r>
-              <a:rPr lang="en-US" sz="3200" b="1" dirty="0"/>
-              <a:t>Interesting </a:t>
-            </a:r>
-            <a:r>
-              <a:rPr lang="en-US" sz="3200" b="1" dirty="0" smtClean="0"/>
-              <a:t>Findings</a:t>
-            </a:r>
-            <a:br>
-              <a:rPr lang="en-US" sz="3200" b="1" dirty="0" smtClean="0"/>
-            </a:br>
-            <a:r>
-              <a:rPr lang="en-US" sz="3200" b="1" dirty="0"/>
-              <a:t/>
-            </a:r>
-            <a:br>
-              <a:rPr lang="en-US" sz="3200" b="1" dirty="0"/>
-            </a:br>
-            <a:r>
-              <a:rPr lang="en-US" sz="2000" b="1" dirty="0" smtClean="0"/>
-              <a:t>Heat Tables for Variables</a:t>
-            </a:r>
-            <a:br>
-              <a:rPr lang="en-US" sz="2000" b="1" dirty="0" smtClean="0"/>
-            </a:br>
-            <a:r>
-              <a:rPr lang="en-US" sz="2000" b="1" dirty="0" smtClean="0"/>
-              <a:t/>
-            </a:r>
-            <a:br>
-              <a:rPr lang="en-US" sz="2000" b="1" dirty="0" smtClean="0"/>
-            </a:br>
-            <a:r>
-              <a:rPr lang="en-US" sz="2000" b="1" dirty="0" smtClean="0"/>
-              <a:t>Using Social Media to log into another Website &amp;</a:t>
-            </a:r>
-            <a:br>
-              <a:rPr lang="en-US" sz="2000" b="1" dirty="0" smtClean="0"/>
-            </a:br>
-            <a:r>
-              <a:rPr lang="en-US" sz="2000" b="1" dirty="0" smtClean="0"/>
-              <a:t>How do You Update Your Phone Apps</a:t>
-            </a:r>
-            <a:r>
-              <a:rPr lang="en-US" dirty="0"/>
-              <a:t/>
-            </a:r>
-            <a:br>
-              <a:rPr lang="en-US" dirty="0"/>
-            </a:br>
-            <a:r>
-              <a:rPr lang="en-US" dirty="0"/>
-              <a:t/>
-            </a:r>
-            <a:br>
-              <a:rPr lang="en-US" dirty="0"/>
-            </a:br>
-            <a:r>
-              <a:rPr lang="en-US" dirty="0"/>
-              <a:t/>
-            </a:r>
-            <a:br>
-              <a:rPr lang="en-US" dirty="0"/>
-            </a:br>
-            <a:r>
-              <a:rPr lang="en-US" dirty="0"/>
-              <a:t/>
-            </a:r>
-            <a:br>
-              <a:rPr lang="en-US" dirty="0"/>
-            </a:br>
-            <a:r>
-              <a:rPr lang="en-US" sz="2000" dirty="0"/>
-              <a:t/>
-            </a:r>
-            <a:br>
-              <a:rPr lang="en-US" sz="2000" dirty="0"/>
-            </a:br>
-            <a:endParaRPr lang="en-US" sz="2000" dirty="0"/>
-          </a:p>
-        </p:txBody>
-      </p:sp>
-      <p:sp>
-        <p:nvSpPr>
-          <p:cNvPr id="11" name="Text Placeholder 10"/>
-          <p:cNvSpPr>
-            <a:spLocks noGrp="1"/>
-          </p:cNvSpPr>
-          <p:nvPr>
-            <p:ph type="body" sz="quarter" idx="3"/>
-          </p:nvPr>
-        </p:nvSpPr>
-        <p:spPr>
-          <a:xfrm>
-            <a:off x="7818463" y="729472"/>
-            <a:ext cx="3474720" cy="5355072"/>
-          </a:xfrm>
-        </p:spPr>
-        <p:txBody>
-          <a:bodyPr>
-            <a:normAutofit/>
-          </a:bodyPr>
-          <a:lstStyle/>
-          <a:p>
-            <a:pPr marL="342900" indent="-342900">
-              <a:buFont typeface="Arial" charset="0"/>
-              <a:buChar char="•"/>
-            </a:pPr>
-            <a:endParaRPr lang="en-US" dirty="0" smtClean="0"/>
-          </a:p>
-          <a:p>
-            <a:pPr marL="342900" indent="-342900">
-              <a:buFont typeface="Arial" charset="0"/>
-              <a:buChar char="•"/>
-            </a:pPr>
-            <a:endParaRPr lang="en-US" dirty="0"/>
-          </a:p>
-          <a:p>
-            <a:pPr marL="342900" indent="-342900">
-              <a:buFont typeface="Arial" charset="0"/>
-              <a:buChar char="•"/>
-            </a:pPr>
-            <a:endParaRPr lang="en-US" dirty="0" smtClean="0"/>
-          </a:p>
-        </p:txBody>
-      </p:sp>
-      <p:pic>
-        <p:nvPicPr>
-          <p:cNvPr id="4" name="Content Placeholder 3"/>
-          <p:cNvPicPr>
-            <a:picLocks noGrp="1" noChangeAspect="1"/>
-          </p:cNvPicPr>
-          <p:nvPr>
-            <p:ph sz="quarter" idx="4"/>
-          </p:nvPr>
-        </p:nvPicPr>
-        <p:blipFill>
-          <a:blip r:embed="rId3">
-            <a:extLst>
-              <a:ext uri="{28A0092B-C50C-407E-A947-70E740481C1C}">
-                <a14:useLocalDpi xmlns:a14="http://schemas.microsoft.com/office/drawing/2010/main" val="0"/>
-              </a:ext>
-            </a:extLst>
-          </a:blip>
-          <a:stretch>
-            <a:fillRect/>
-          </a:stretch>
-        </p:blipFill>
-        <p:spPr>
-          <a:xfrm>
-            <a:off x="3978249" y="729472"/>
-            <a:ext cx="3507607" cy="2711818"/>
-          </a:xfrm>
-        </p:spPr>
-      </p:pic>
-      <p:pic>
-        <p:nvPicPr>
-          <p:cNvPr id="7" name="Picture 6"/>
-          <p:cNvPicPr>
-            <a:picLocks noChangeAspect="1"/>
-          </p:cNvPicPr>
-          <p:nvPr/>
-        </p:nvPicPr>
-        <p:blipFill>
-          <a:blip r:embed="rId4">
-            <a:extLst>
-              <a:ext uri="{28A0092B-C50C-407E-A947-70E740481C1C}">
-                <a14:useLocalDpi xmlns:a14="http://schemas.microsoft.com/office/drawing/2010/main" val="0"/>
-              </a:ext>
-            </a:extLst>
-          </a:blip>
-          <a:stretch>
-            <a:fillRect/>
-          </a:stretch>
-        </p:blipFill>
-        <p:spPr>
-          <a:xfrm>
-            <a:off x="3978248" y="3441290"/>
-            <a:ext cx="3453843" cy="2497394"/>
-          </a:xfrm>
-          <a:prstGeom prst="rect">
-            <a:avLst/>
-          </a:prstGeom>
-        </p:spPr>
-      </p:pic>
-      <p:sp>
-        <p:nvSpPr>
-          <p:cNvPr id="8" name="TextBox 7"/>
-          <p:cNvSpPr txBox="1"/>
-          <p:nvPr/>
-        </p:nvSpPr>
-        <p:spPr>
-          <a:xfrm>
-            <a:off x="7818463" y="825910"/>
-            <a:ext cx="3474720" cy="5078313"/>
-          </a:xfrm>
-          <a:prstGeom prst="rect">
-            <a:avLst/>
-          </a:prstGeom>
-          <a:noFill/>
-        </p:spPr>
-        <p:txBody>
-          <a:bodyPr wrap="square" rtlCol="0">
-            <a:spAutoFit/>
-          </a:bodyPr>
-          <a:lstStyle/>
-          <a:p>
-            <a:pPr marL="285750" indent="-285750">
-              <a:buFont typeface="Arial" charset="0"/>
-              <a:buChar char="•"/>
-            </a:pPr>
-            <a:r>
-              <a:rPr lang="en-US" dirty="0" smtClean="0"/>
-              <a:t>40.4% have not used their social media account to log into another account.</a:t>
-            </a:r>
-          </a:p>
-          <a:p>
-            <a:pPr marL="285750" indent="-285750">
-              <a:buFont typeface="Arial" charset="0"/>
-              <a:buChar char="•"/>
-            </a:pPr>
-            <a:r>
-              <a:rPr lang="en-US" dirty="0" smtClean="0"/>
-              <a:t>36.3% did not respond to the question (#2 Response). Higher percentages of the older generations  drove the results.</a:t>
-            </a:r>
-          </a:p>
-          <a:p>
-            <a:pPr marL="285750" indent="-285750">
-              <a:buFont typeface="Arial" charset="0"/>
-              <a:buChar char="•"/>
-            </a:pPr>
-            <a:endParaRPr lang="en-US" dirty="0"/>
-          </a:p>
-          <a:p>
-            <a:pPr marL="285750" indent="-285750">
-              <a:buFont typeface="Arial" charset="0"/>
-              <a:buChar char="•"/>
-            </a:pPr>
-            <a:endParaRPr lang="en-US" dirty="0" smtClean="0"/>
-          </a:p>
-          <a:p>
-            <a:pPr marL="285750" indent="-285750">
-              <a:buFont typeface="Arial" charset="0"/>
-              <a:buChar char="•"/>
-            </a:pPr>
-            <a:endParaRPr lang="en-US" dirty="0"/>
-          </a:p>
-          <a:p>
-            <a:pPr marL="285750" indent="-285750">
-              <a:buFont typeface="Arial" charset="0"/>
-              <a:buChar char="•"/>
-            </a:pPr>
-            <a:r>
-              <a:rPr lang="en-US" dirty="0" smtClean="0"/>
-              <a:t>36.7% chose to not respond to question of how they update their phone apps (#1)</a:t>
-            </a:r>
-          </a:p>
-          <a:p>
-            <a:pPr marL="285750" indent="-285750">
-              <a:buFont typeface="Arial" charset="0"/>
-              <a:buChar char="•"/>
-            </a:pPr>
-            <a:r>
-              <a:rPr lang="en-US" dirty="0" smtClean="0"/>
-              <a:t>27.5% update their apps when convenient.</a:t>
-            </a:r>
-          </a:p>
-          <a:p>
-            <a:pPr marL="285750" indent="-285750">
-              <a:buFont typeface="Arial" charset="0"/>
-              <a:buChar char="•"/>
-            </a:pPr>
-            <a:r>
-              <a:rPr lang="en-US" dirty="0" smtClean="0"/>
-              <a:t>20.5% (#3) set up their devices to automatically update their apps.</a:t>
-            </a:r>
-            <a:endParaRPr lang="en-US" dirty="0"/>
-          </a:p>
-        </p:txBody>
-      </p:sp>
-    </p:spTree>
-    <p:extLst>
-      <p:ext uri="{BB962C8B-B14F-4D97-AF65-F5344CB8AC3E}">
-        <p14:creationId xmlns:p14="http://schemas.microsoft.com/office/powerpoint/2010/main" val="1211573590"/>
-      </p:ext>
-    </p:extLst>
-  </p:cSld>
-  <p:clrMapOvr>
-    <a:masterClrMapping/>
-  </p:clrMapOvr>
-</p:sld>
-</file>
-
-<file path=ppt/slides/slide34.xml><?xml version="1.0" encoding="utf-8"?>
-<p:sld xmlns:a="http://schemas.openxmlformats.org/drawingml/2006/main" xmlns:r="http://schemas.openxmlformats.org/officeDocument/2006/relationships" xmlns:p="http://schemas.openxmlformats.org/presentationml/2006/main">
-  <p:cSld>
-    <p:spTree>
-      <p:nvGrpSpPr>
-        <p:cNvPr id="1" name=""/>
-        <p:cNvGrpSpPr/>
-        <p:nvPr/>
-      </p:nvGrpSpPr>
-      <p:grpSpPr>
-        <a:xfrm>
-          <a:off x="0" y="0"/>
-          <a:ext cx="0" cy="0"/>
-          <a:chOff x="0" y="0"/>
-          <a:chExt cx="0" cy="0"/>
-        </a:xfrm>
-      </p:grpSpPr>
-      <p:sp>
-        <p:nvSpPr>
-          <p:cNvPr id="2" name="Title 1"/>
-          <p:cNvSpPr>
-            <a:spLocks noGrp="1"/>
-          </p:cNvSpPr>
-          <p:nvPr>
-            <p:ph type="title"/>
-          </p:nvPr>
-        </p:nvSpPr>
-        <p:spPr/>
-        <p:txBody>
-          <a:bodyPr>
-            <a:normAutofit fontScale="90000"/>
-          </a:bodyPr>
-          <a:lstStyle/>
-          <a:p>
-            <a:r>
-              <a:rPr lang="en-US" sz="3200" b="1" dirty="0"/>
-              <a:t>Interesting </a:t>
-            </a:r>
-            <a:r>
-              <a:rPr lang="en-US" sz="3200" b="1" dirty="0" smtClean="0"/>
-              <a:t>Findings</a:t>
-            </a:r>
-            <a:br>
-              <a:rPr lang="en-US" sz="3200" b="1" dirty="0" smtClean="0"/>
-            </a:br>
-            <a:r>
-              <a:rPr lang="en-US" sz="3200" b="1" dirty="0"/>
-              <a:t/>
-            </a:r>
-            <a:br>
-              <a:rPr lang="en-US" sz="3200" b="1" dirty="0"/>
-            </a:br>
-            <a:r>
-              <a:rPr lang="en-US" sz="2000" b="1" dirty="0" smtClean="0"/>
-              <a:t>Heat Tables for Variables</a:t>
-            </a:r>
-            <a:br>
-              <a:rPr lang="en-US" sz="2000" b="1" dirty="0" smtClean="0"/>
-            </a:br>
-            <a:r>
-              <a:rPr lang="en-US" sz="2000" b="1" dirty="0" smtClean="0"/>
-              <a:t/>
-            </a:r>
-            <a:br>
-              <a:rPr lang="en-US" sz="2000" b="1" dirty="0" smtClean="0"/>
-            </a:br>
-            <a:r>
-              <a:rPr lang="en-US" sz="2000" b="1" dirty="0" smtClean="0"/>
-              <a:t>Making Online Purchases on Public </a:t>
-            </a:r>
-            <a:r>
-              <a:rPr lang="en-US" sz="2000" b="1" dirty="0" err="1" smtClean="0"/>
-              <a:t>WiFi</a:t>
-            </a:r>
-            <a:r>
-              <a:rPr lang="en-US" sz="2000" b="1" dirty="0" smtClean="0"/>
-              <a:t>  &amp;</a:t>
-            </a:r>
-            <a:br>
-              <a:rPr lang="en-US" sz="2000" b="1" dirty="0" smtClean="0"/>
-            </a:br>
-            <a:r>
-              <a:rPr lang="en-US" sz="2000" b="1" dirty="0" smtClean="0"/>
-              <a:t>Making Financial Transactions while on Public </a:t>
-            </a:r>
-            <a:r>
-              <a:rPr lang="en-US" sz="2000" b="1" dirty="0" err="1" smtClean="0"/>
-              <a:t>WiFi</a:t>
-            </a:r>
-            <a:r>
-              <a:rPr lang="en-US" dirty="0"/>
-              <a:t/>
-            </a:r>
-            <a:br>
-              <a:rPr lang="en-US" dirty="0"/>
-            </a:br>
-            <a:r>
-              <a:rPr lang="en-US" dirty="0"/>
-              <a:t/>
-            </a:r>
-            <a:br>
-              <a:rPr lang="en-US" dirty="0"/>
-            </a:br>
-            <a:r>
-              <a:rPr lang="en-US" dirty="0"/>
-              <a:t/>
-            </a:r>
-            <a:br>
-              <a:rPr lang="en-US" dirty="0"/>
-            </a:br>
-            <a:r>
-              <a:rPr lang="en-US" dirty="0"/>
-              <a:t/>
-            </a:r>
-            <a:br>
-              <a:rPr lang="en-US" dirty="0"/>
-            </a:br>
-            <a:r>
-              <a:rPr lang="en-US" sz="2000" dirty="0"/>
-              <a:t/>
-            </a:r>
-            <a:br>
-              <a:rPr lang="en-US" sz="2000" dirty="0"/>
-            </a:br>
-            <a:endParaRPr lang="en-US" sz="2000" dirty="0"/>
-          </a:p>
-        </p:txBody>
-      </p:sp>
-      <p:sp>
-        <p:nvSpPr>
-          <p:cNvPr id="11" name="Text Placeholder 10"/>
-          <p:cNvSpPr>
-            <a:spLocks noGrp="1"/>
-          </p:cNvSpPr>
-          <p:nvPr>
-            <p:ph type="body" sz="quarter" idx="3"/>
-          </p:nvPr>
-        </p:nvSpPr>
-        <p:spPr>
-          <a:xfrm>
-            <a:off x="7818463" y="729472"/>
-            <a:ext cx="3474720" cy="5355072"/>
-          </a:xfrm>
-        </p:spPr>
-        <p:txBody>
-          <a:bodyPr>
-            <a:normAutofit/>
-          </a:bodyPr>
-          <a:lstStyle/>
-          <a:p>
-            <a:pPr marL="342900" indent="-342900">
-              <a:buFont typeface="Arial" charset="0"/>
-              <a:buChar char="•"/>
-            </a:pPr>
-            <a:endParaRPr lang="en-US" dirty="0" smtClean="0"/>
-          </a:p>
-          <a:p>
-            <a:pPr marL="342900" indent="-342900">
-              <a:buFont typeface="Arial" charset="0"/>
-              <a:buChar char="•"/>
-            </a:pPr>
-            <a:endParaRPr lang="en-US" dirty="0"/>
-          </a:p>
-          <a:p>
-            <a:pPr marL="342900" indent="-342900">
-              <a:buFont typeface="Arial" charset="0"/>
-              <a:buChar char="•"/>
-            </a:pPr>
-            <a:endParaRPr lang="en-US" dirty="0" smtClean="0"/>
-          </a:p>
-        </p:txBody>
-      </p:sp>
-      <p:sp>
-        <p:nvSpPr>
-          <p:cNvPr id="8" name="TextBox 7"/>
-          <p:cNvSpPr txBox="1"/>
-          <p:nvPr/>
-        </p:nvSpPr>
-        <p:spPr>
-          <a:xfrm>
-            <a:off x="7818463" y="825910"/>
-            <a:ext cx="3474720" cy="5078313"/>
-          </a:xfrm>
-          <a:prstGeom prst="rect">
-            <a:avLst/>
-          </a:prstGeom>
-          <a:noFill/>
-        </p:spPr>
-        <p:txBody>
-          <a:bodyPr wrap="square" rtlCol="0">
-            <a:spAutoFit/>
-          </a:bodyPr>
-          <a:lstStyle/>
-          <a:p>
-            <a:pPr marL="285750" indent="-285750">
-              <a:buFont typeface="Arial" charset="0"/>
-              <a:buChar char="•"/>
-            </a:pPr>
-            <a:r>
-              <a:rPr lang="en-US" dirty="0" smtClean="0"/>
-              <a:t>51.9% (#1) did not respond to this question.</a:t>
-            </a:r>
-          </a:p>
-          <a:p>
-            <a:pPr marL="285750" indent="-285750">
-              <a:buFont typeface="Arial" charset="0"/>
-              <a:buChar char="•"/>
-            </a:pPr>
-            <a:r>
-              <a:rPr lang="en-US" dirty="0" smtClean="0"/>
-              <a:t>38.1% (#2) do not make purchases while on Public </a:t>
-            </a:r>
-            <a:r>
-              <a:rPr lang="en-US" dirty="0" err="1" smtClean="0"/>
-              <a:t>WiFi</a:t>
-            </a:r>
-            <a:endParaRPr lang="en-US" dirty="0" smtClean="0"/>
-          </a:p>
-          <a:p>
-            <a:pPr marL="285750" indent="-285750">
-              <a:buFont typeface="Arial" charset="0"/>
-              <a:buChar char="•"/>
-            </a:pPr>
-            <a:r>
-              <a:rPr lang="en-US" dirty="0" smtClean="0"/>
-              <a:t>9.6% do make purchases while on Public </a:t>
-            </a:r>
-            <a:r>
-              <a:rPr lang="en-US" dirty="0" err="1" smtClean="0"/>
-              <a:t>WiFi</a:t>
-            </a:r>
-            <a:endParaRPr lang="en-US" dirty="0" smtClean="0"/>
-          </a:p>
-          <a:p>
-            <a:pPr marL="285750" indent="-285750">
-              <a:buFont typeface="Arial" charset="0"/>
-              <a:buChar char="•"/>
-            </a:pPr>
-            <a:r>
-              <a:rPr lang="en-US" dirty="0" smtClean="0"/>
-              <a:t>Missing observations cause concern in predictions.</a:t>
-            </a:r>
-          </a:p>
-          <a:p>
-            <a:pPr marL="285750" indent="-285750">
-              <a:buFont typeface="Arial" charset="0"/>
-              <a:buChar char="•"/>
-            </a:pPr>
-            <a:endParaRPr lang="en-US" dirty="0"/>
-          </a:p>
-          <a:p>
-            <a:pPr marL="285750" indent="-285750">
-              <a:buFont typeface="Arial" charset="0"/>
-              <a:buChar char="•"/>
-            </a:pPr>
-            <a:endParaRPr lang="en-US" dirty="0" smtClean="0"/>
-          </a:p>
-          <a:p>
-            <a:pPr marL="285750" indent="-285750">
-              <a:buFont typeface="Arial" charset="0"/>
-              <a:buChar char="•"/>
-            </a:pPr>
-            <a:r>
-              <a:rPr lang="en-US" dirty="0" smtClean="0"/>
-              <a:t>51.9% (#1) did not respond to this question.</a:t>
-            </a:r>
-          </a:p>
-          <a:p>
-            <a:pPr marL="285750" indent="-285750">
-              <a:buFont typeface="Arial" charset="0"/>
-              <a:buChar char="•"/>
-            </a:pPr>
-            <a:r>
-              <a:rPr lang="en-US" dirty="0" smtClean="0"/>
-              <a:t>39.1% (#2) do not do financial transactions on Public </a:t>
-            </a:r>
-            <a:r>
-              <a:rPr lang="en-US" dirty="0" err="1" smtClean="0"/>
-              <a:t>WiFi</a:t>
-            </a:r>
-            <a:endParaRPr lang="en-US" dirty="0" smtClean="0"/>
-          </a:p>
-          <a:p>
-            <a:pPr marL="285750" indent="-285750">
-              <a:buFont typeface="Arial" charset="0"/>
-              <a:buChar char="•"/>
-            </a:pPr>
-            <a:r>
-              <a:rPr lang="en-US" dirty="0" smtClean="0"/>
-              <a:t>8.8% make financial transactions on Public </a:t>
-            </a:r>
-            <a:r>
-              <a:rPr lang="en-US" dirty="0" err="1" smtClean="0"/>
-              <a:t>WiFi</a:t>
-            </a:r>
-            <a:r>
-              <a:rPr lang="en-US" dirty="0" smtClean="0"/>
-              <a:t>.</a:t>
-            </a:r>
-          </a:p>
-          <a:p>
-            <a:pPr marL="285750" indent="-285750">
-              <a:buFont typeface="Arial" charset="0"/>
-              <a:buChar char="•"/>
-            </a:pPr>
-            <a:r>
-              <a:rPr lang="en-US" dirty="0" smtClean="0"/>
-              <a:t>Missing observations cause concern in predictions.</a:t>
-            </a:r>
-            <a:endParaRPr lang="en-US" dirty="0"/>
-          </a:p>
-        </p:txBody>
-      </p:sp>
-      <p:pic>
-        <p:nvPicPr>
-          <p:cNvPr id="5" name="Content Placeholder 4"/>
-          <p:cNvPicPr>
-            <a:picLocks noGrp="1" noChangeAspect="1"/>
-          </p:cNvPicPr>
-          <p:nvPr>
-            <p:ph sz="quarter" idx="4"/>
-          </p:nvPr>
-        </p:nvPicPr>
-        <p:blipFill>
-          <a:blip r:embed="rId3">
-            <a:extLst>
-              <a:ext uri="{28A0092B-C50C-407E-A947-70E740481C1C}">
-                <a14:useLocalDpi xmlns:a14="http://schemas.microsoft.com/office/drawing/2010/main" val="0"/>
-              </a:ext>
-            </a:extLst>
-          </a:blip>
-          <a:stretch>
-            <a:fillRect/>
-          </a:stretch>
-        </p:blipFill>
-        <p:spPr>
-          <a:xfrm>
-            <a:off x="3925937" y="729471"/>
-            <a:ext cx="3576075" cy="2544671"/>
-          </a:xfrm>
-        </p:spPr>
-      </p:pic>
-      <p:pic>
-        <p:nvPicPr>
-          <p:cNvPr id="6" name="Picture 5"/>
-          <p:cNvPicPr>
-            <a:picLocks noChangeAspect="1"/>
-          </p:cNvPicPr>
-          <p:nvPr/>
-        </p:nvPicPr>
-        <p:blipFill>
-          <a:blip r:embed="rId4">
-            <a:extLst>
-              <a:ext uri="{28A0092B-C50C-407E-A947-70E740481C1C}">
-                <a14:useLocalDpi xmlns:a14="http://schemas.microsoft.com/office/drawing/2010/main" val="0"/>
-              </a:ext>
-            </a:extLst>
-          </a:blip>
-          <a:stretch>
-            <a:fillRect/>
-          </a:stretch>
-        </p:blipFill>
-        <p:spPr>
-          <a:xfrm>
-            <a:off x="3925937" y="3451122"/>
-            <a:ext cx="3576075" cy="2736261"/>
-          </a:xfrm>
-          <a:prstGeom prst="rect">
-            <a:avLst/>
-          </a:prstGeom>
-        </p:spPr>
-      </p:pic>
-    </p:spTree>
-    <p:extLst>
-      <p:ext uri="{BB962C8B-B14F-4D97-AF65-F5344CB8AC3E}">
-        <p14:creationId xmlns:p14="http://schemas.microsoft.com/office/powerpoint/2010/main" val="1582426005"/>
-      </p:ext>
-    </p:extLst>
-  </p:cSld>
-  <p:clrMapOvr>
-    <a:masterClrMapping/>
-  </p:clrMapOvr>
-</p:sld>
-</file>
-
-<file path=ppt/slides/slide35.xml><?xml version="1.0" encoding="utf-8"?>
-<p:sld xmlns:a="http://schemas.openxmlformats.org/drawingml/2006/main" xmlns:r="http://schemas.openxmlformats.org/officeDocument/2006/relationships" xmlns:p="http://schemas.openxmlformats.org/presentationml/2006/main">
-  <p:cSld>
-    <p:spTree>
-      <p:nvGrpSpPr>
-        <p:cNvPr id="1" name=""/>
-        <p:cNvGrpSpPr/>
-        <p:nvPr/>
-      </p:nvGrpSpPr>
-      <p:grpSpPr>
-        <a:xfrm>
-          <a:off x="0" y="0"/>
-          <a:ext cx="0" cy="0"/>
-          <a:chOff x="0" y="0"/>
-          <a:chExt cx="0" cy="0"/>
-        </a:xfrm>
-      </p:grpSpPr>
-      <p:sp>
-        <p:nvSpPr>
-          <p:cNvPr id="2" name="Title 1"/>
-          <p:cNvSpPr>
-            <a:spLocks noGrp="1"/>
-          </p:cNvSpPr>
-          <p:nvPr>
-            <p:ph type="title"/>
-          </p:nvPr>
-        </p:nvSpPr>
-        <p:spPr/>
-        <p:txBody>
-          <a:bodyPr>
-            <a:normAutofit fontScale="90000"/>
-          </a:bodyPr>
-          <a:lstStyle/>
-          <a:p>
-            <a:r>
-              <a:rPr lang="en-US" sz="3200" b="1" dirty="0"/>
-              <a:t>Interesting </a:t>
-            </a:r>
-            <a:r>
-              <a:rPr lang="en-US" sz="3200" b="1" dirty="0" smtClean="0"/>
-              <a:t>Findings</a:t>
-            </a:r>
-            <a:br>
-              <a:rPr lang="en-US" sz="3200" b="1" dirty="0" smtClean="0"/>
-            </a:br>
-            <a:r>
-              <a:rPr lang="en-US" sz="3200" b="1" dirty="0"/>
-              <a:t/>
-            </a:r>
-            <a:br>
-              <a:rPr lang="en-US" sz="3200" b="1" dirty="0"/>
-            </a:br>
-            <a:r>
-              <a:rPr lang="en-US" sz="2000" b="1" dirty="0" smtClean="0"/>
-              <a:t>Heat Tables for Variables</a:t>
-            </a:r>
-            <a:br>
-              <a:rPr lang="en-US" sz="2000" b="1" dirty="0" smtClean="0"/>
-            </a:br>
-            <a:r>
-              <a:rPr lang="en-US" sz="2000" b="1" dirty="0" smtClean="0"/>
-              <a:t/>
-            </a:r>
-            <a:br>
-              <a:rPr lang="en-US" sz="2000" b="1" dirty="0" smtClean="0"/>
-            </a:br>
-            <a:r>
-              <a:rPr lang="en-US" sz="2000" b="1" dirty="0" smtClean="0"/>
-              <a:t>Do you think a significant cyber attack on public infrastructure is likely in next 5 years?  &amp;</a:t>
-            </a:r>
-            <a:br>
-              <a:rPr lang="en-US" sz="2000" b="1" dirty="0" smtClean="0"/>
-            </a:br>
-            <a:r>
-              <a:rPr lang="en-US" sz="2000" b="1" dirty="0" smtClean="0"/>
-              <a:t>How prepared do you think US Government is to prevent cyber attacks on public infrastructure?</a:t>
-            </a:r>
-            <a:r>
-              <a:rPr lang="en-US" dirty="0"/>
-              <a:t/>
-            </a:r>
-            <a:br>
-              <a:rPr lang="en-US" dirty="0"/>
-            </a:br>
-            <a:r>
-              <a:rPr lang="en-US" dirty="0"/>
-              <a:t/>
-            </a:r>
-            <a:br>
-              <a:rPr lang="en-US" dirty="0"/>
-            </a:br>
-            <a:r>
-              <a:rPr lang="en-US" sz="2000" dirty="0"/>
-              <a:t/>
-            </a:r>
-            <a:br>
-              <a:rPr lang="en-US" sz="2000" dirty="0"/>
-            </a:br>
-            <a:endParaRPr lang="en-US" sz="2000" dirty="0"/>
-          </a:p>
-        </p:txBody>
-      </p:sp>
-      <p:sp>
-        <p:nvSpPr>
-          <p:cNvPr id="11" name="Text Placeholder 10"/>
-          <p:cNvSpPr>
-            <a:spLocks noGrp="1"/>
-          </p:cNvSpPr>
-          <p:nvPr>
-            <p:ph type="body" sz="quarter" idx="3"/>
-          </p:nvPr>
-        </p:nvSpPr>
-        <p:spPr>
-          <a:xfrm>
-            <a:off x="7818463" y="729472"/>
-            <a:ext cx="3474720" cy="5355072"/>
-          </a:xfrm>
-        </p:spPr>
-        <p:txBody>
-          <a:bodyPr>
-            <a:normAutofit/>
-          </a:bodyPr>
-          <a:lstStyle/>
-          <a:p>
-            <a:pPr marL="342900" indent="-342900">
-              <a:buFont typeface="Arial" charset="0"/>
-              <a:buChar char="•"/>
-            </a:pPr>
-            <a:endParaRPr lang="en-US" dirty="0" smtClean="0"/>
-          </a:p>
-          <a:p>
-            <a:pPr marL="342900" indent="-342900">
-              <a:buFont typeface="Arial" charset="0"/>
-              <a:buChar char="•"/>
-            </a:pPr>
-            <a:endParaRPr lang="en-US" dirty="0"/>
-          </a:p>
-          <a:p>
-            <a:pPr marL="342900" indent="-342900">
-              <a:buFont typeface="Arial" charset="0"/>
-              <a:buChar char="•"/>
-            </a:pPr>
-            <a:endParaRPr lang="en-US" dirty="0" smtClean="0"/>
-          </a:p>
-        </p:txBody>
-      </p:sp>
-      <p:sp>
-        <p:nvSpPr>
-          <p:cNvPr id="8" name="TextBox 7"/>
-          <p:cNvSpPr txBox="1"/>
-          <p:nvPr/>
-        </p:nvSpPr>
-        <p:spPr>
-          <a:xfrm>
-            <a:off x="7818463" y="825910"/>
-            <a:ext cx="3474720" cy="4801314"/>
-          </a:xfrm>
-          <a:prstGeom prst="rect">
-            <a:avLst/>
-          </a:prstGeom>
-          <a:noFill/>
-        </p:spPr>
-        <p:txBody>
-          <a:bodyPr wrap="square" rtlCol="0">
-            <a:spAutoFit/>
-          </a:bodyPr>
-          <a:lstStyle/>
-          <a:p>
-            <a:pPr marL="285750" indent="-285750">
-              <a:buFont typeface="Arial" charset="0"/>
-              <a:buChar char="•"/>
-            </a:pPr>
-            <a:r>
-              <a:rPr lang="en-US" dirty="0" smtClean="0"/>
-              <a:t>52.2% think a significant cyber attack on our infrastructure will PROBABLY happen in next 5 years.</a:t>
-            </a:r>
-          </a:p>
-          <a:p>
-            <a:pPr marL="285750" indent="-285750">
-              <a:buFont typeface="Arial" charset="0"/>
-              <a:buChar char="•"/>
-            </a:pPr>
-            <a:r>
-              <a:rPr lang="en-US" dirty="0" smtClean="0"/>
-              <a:t>21% think it probably will not happen.</a:t>
-            </a:r>
-          </a:p>
-          <a:p>
-            <a:pPr marL="285750" indent="-285750">
-              <a:buFont typeface="Arial" charset="0"/>
-              <a:buChar char="•"/>
-            </a:pPr>
-            <a:r>
-              <a:rPr lang="en-US" dirty="0" smtClean="0"/>
-              <a:t>20.6% think it definitely will happen.</a:t>
-            </a:r>
-          </a:p>
-          <a:p>
-            <a:pPr marL="285750" indent="-285750">
-              <a:buFont typeface="Arial" charset="0"/>
-              <a:buChar char="•"/>
-            </a:pPr>
-            <a:endParaRPr lang="en-US" dirty="0" smtClean="0"/>
-          </a:p>
-          <a:p>
-            <a:pPr marL="285750" indent="-285750">
-              <a:buFont typeface="Arial" charset="0"/>
-              <a:buChar char="•"/>
-            </a:pPr>
-            <a:endParaRPr lang="en-US" dirty="0"/>
-          </a:p>
-          <a:p>
-            <a:pPr marL="285750" indent="-285750">
-              <a:buFont typeface="Arial" charset="0"/>
-              <a:buChar char="•"/>
-            </a:pPr>
-            <a:r>
-              <a:rPr lang="en-US" dirty="0" smtClean="0"/>
-              <a:t>49.8% think we are somewhat prepared to defend an attack on US infrastructure.</a:t>
-            </a:r>
-          </a:p>
-          <a:p>
-            <a:pPr marL="285750" indent="-285750">
-              <a:buFont typeface="Arial" charset="0"/>
-              <a:buChar char="•"/>
-            </a:pPr>
-            <a:r>
-              <a:rPr lang="en-US" dirty="0" smtClean="0"/>
-              <a:t>20.2% think we are not too prepared.</a:t>
-            </a:r>
-          </a:p>
-          <a:p>
-            <a:pPr marL="285750" indent="-285750">
-              <a:buFont typeface="Arial" charset="0"/>
-              <a:buChar char="•"/>
-            </a:pPr>
-            <a:r>
-              <a:rPr lang="en-US" dirty="0" smtClean="0"/>
-              <a:t>22.5% feel confident that we are prepared.</a:t>
-            </a:r>
-            <a:endParaRPr lang="en-US" dirty="0"/>
-          </a:p>
-        </p:txBody>
-      </p:sp>
-      <p:pic>
-        <p:nvPicPr>
-          <p:cNvPr id="4" name="Content Placeholder 3"/>
-          <p:cNvPicPr>
-            <a:picLocks noGrp="1" noChangeAspect="1"/>
-          </p:cNvPicPr>
-          <p:nvPr>
-            <p:ph sz="quarter" idx="4"/>
-          </p:nvPr>
-        </p:nvPicPr>
-        <p:blipFill>
-          <a:blip r:embed="rId3">
-            <a:extLst>
-              <a:ext uri="{28A0092B-C50C-407E-A947-70E740481C1C}">
-                <a14:useLocalDpi xmlns:a14="http://schemas.microsoft.com/office/drawing/2010/main" val="0"/>
-              </a:ext>
-            </a:extLst>
-          </a:blip>
-          <a:stretch>
-            <a:fillRect/>
-          </a:stretch>
-        </p:blipFill>
-        <p:spPr>
-          <a:xfrm>
-            <a:off x="3579032" y="729472"/>
-            <a:ext cx="3860800" cy="2614767"/>
-          </a:xfrm>
-        </p:spPr>
-      </p:pic>
-      <p:pic>
-        <p:nvPicPr>
-          <p:cNvPr id="7" name="Picture 6"/>
-          <p:cNvPicPr>
-            <a:picLocks noChangeAspect="1"/>
-          </p:cNvPicPr>
-          <p:nvPr/>
-        </p:nvPicPr>
-        <p:blipFill>
-          <a:blip r:embed="rId4">
-            <a:extLst>
-              <a:ext uri="{28A0092B-C50C-407E-A947-70E740481C1C}">
-                <a14:useLocalDpi xmlns:a14="http://schemas.microsoft.com/office/drawing/2010/main" val="0"/>
-              </a:ext>
-            </a:extLst>
-          </a:blip>
-          <a:stretch>
-            <a:fillRect/>
-          </a:stretch>
-        </p:blipFill>
-        <p:spPr>
-          <a:xfrm>
-            <a:off x="3579032" y="3362631"/>
-            <a:ext cx="3860800" cy="2822601"/>
-          </a:xfrm>
-          <a:prstGeom prst="rect">
-            <a:avLst/>
-          </a:prstGeom>
-        </p:spPr>
-      </p:pic>
-    </p:spTree>
-    <p:extLst>
-      <p:ext uri="{BB962C8B-B14F-4D97-AF65-F5344CB8AC3E}">
-        <p14:creationId xmlns:p14="http://schemas.microsoft.com/office/powerpoint/2010/main" val="87454349"/>
-      </p:ext>
-    </p:extLst>
-  </p:cSld>
-  <p:clrMapOvr>
-    <a:masterClrMapping/>
-  </p:clrMapOvr>
-</p:sld>
-</file>
-
-<file path=ppt/slides/slide36.xml><?xml version="1.0" encoding="utf-8"?>
-<p:sld xmlns:a="http://schemas.openxmlformats.org/drawingml/2006/main" xmlns:r="http://schemas.openxmlformats.org/officeDocument/2006/relationships" xmlns:p="http://schemas.openxmlformats.org/presentationml/2006/main">
-  <p:cSld>
-    <p:spTree>
-      <p:nvGrpSpPr>
-        <p:cNvPr id="1" name=""/>
-        <p:cNvGrpSpPr/>
-        <p:nvPr/>
-      </p:nvGrpSpPr>
-      <p:grpSpPr>
-        <a:xfrm>
-          <a:off x="0" y="0"/>
-          <a:ext cx="0" cy="0"/>
-          <a:chOff x="0" y="0"/>
-          <a:chExt cx="0" cy="0"/>
-        </a:xfrm>
-      </p:grpSpPr>
-      <p:sp>
-        <p:nvSpPr>
-          <p:cNvPr id="2" name="Title 1"/>
-          <p:cNvSpPr>
-            <a:spLocks noGrp="1"/>
-          </p:cNvSpPr>
-          <p:nvPr>
-            <p:ph type="title"/>
-          </p:nvPr>
-        </p:nvSpPr>
-        <p:spPr/>
-        <p:txBody>
-          <a:bodyPr>
-            <a:normAutofit fontScale="90000"/>
-          </a:bodyPr>
-          <a:lstStyle/>
-          <a:p>
-            <a:r>
-              <a:rPr lang="en-US" sz="3200" b="1" dirty="0"/>
-              <a:t>Interesting </a:t>
-            </a:r>
-            <a:r>
-              <a:rPr lang="en-US" sz="3200" b="1" dirty="0" smtClean="0"/>
-              <a:t>Findings</a:t>
-            </a:r>
-            <a:br>
-              <a:rPr lang="en-US" sz="3200" b="1" dirty="0" smtClean="0"/>
-            </a:br>
-            <a:r>
-              <a:rPr lang="en-US" sz="3200" b="1" dirty="0"/>
-              <a:t/>
-            </a:r>
-            <a:br>
-              <a:rPr lang="en-US" sz="3200" b="1" dirty="0"/>
-            </a:br>
-            <a:r>
-              <a:rPr lang="en-US" sz="2000" b="1" dirty="0" smtClean="0"/>
-              <a:t>Heat Tables for Variables</a:t>
-            </a:r>
-            <a:br>
-              <a:rPr lang="en-US" sz="2000" b="1" dirty="0" smtClean="0"/>
-            </a:br>
-            <a:r>
-              <a:rPr lang="en-US" sz="2000" b="1" dirty="0" smtClean="0"/>
-              <a:t/>
-            </a:r>
-            <a:br>
-              <a:rPr lang="en-US" sz="2000" b="1" dirty="0" smtClean="0"/>
-            </a:br>
-            <a:r>
-              <a:rPr lang="en-US" sz="2000" b="1" dirty="0" smtClean="0"/>
-              <a:t>How well prepared </a:t>
-            </a:r>
-            <a:r>
-              <a:rPr lang="en-US" sz="2000" b="1" dirty="0"/>
-              <a:t>d</a:t>
-            </a:r>
-            <a:r>
-              <a:rPr lang="en-US" sz="2000" b="1" dirty="0" smtClean="0"/>
-              <a:t>o you think US is to prevent cyber attack on US agencies? &amp;</a:t>
-            </a:r>
-            <a:br>
-              <a:rPr lang="en-US" sz="2000" b="1" dirty="0" smtClean="0"/>
-            </a:br>
-            <a:r>
-              <a:rPr lang="en-US" sz="2000" b="1" dirty="0" smtClean="0"/>
-              <a:t>Have you heard about publishing </a:t>
-            </a:r>
-            <a:r>
-              <a:rPr lang="en-US" sz="2000" b="1" dirty="0" err="1" smtClean="0"/>
-              <a:t>AshleyMadison.com</a:t>
-            </a:r>
-            <a:r>
-              <a:rPr lang="en-US" sz="2000" b="1" dirty="0" smtClean="0"/>
-              <a:t> customer identities?</a:t>
-            </a:r>
-            <a:r>
-              <a:rPr lang="en-US" dirty="0"/>
-              <a:t/>
-            </a:r>
-            <a:br>
-              <a:rPr lang="en-US" dirty="0"/>
-            </a:br>
-            <a:r>
-              <a:rPr lang="en-US" dirty="0"/>
-              <a:t/>
-            </a:r>
-            <a:br>
-              <a:rPr lang="en-US" dirty="0"/>
-            </a:br>
-            <a:r>
-              <a:rPr lang="en-US" sz="2000" dirty="0"/>
-              <a:t/>
-            </a:r>
-            <a:br>
-              <a:rPr lang="en-US" sz="2000" dirty="0"/>
-            </a:br>
-            <a:endParaRPr lang="en-US" sz="2000" dirty="0"/>
-          </a:p>
-        </p:txBody>
-      </p:sp>
-      <p:sp>
-        <p:nvSpPr>
-          <p:cNvPr id="11" name="Text Placeholder 10"/>
-          <p:cNvSpPr>
-            <a:spLocks noGrp="1"/>
-          </p:cNvSpPr>
-          <p:nvPr>
-            <p:ph type="body" sz="quarter" idx="3"/>
-          </p:nvPr>
-        </p:nvSpPr>
-        <p:spPr>
-          <a:xfrm>
-            <a:off x="7818463" y="729472"/>
-            <a:ext cx="3474720" cy="5355072"/>
-          </a:xfrm>
-        </p:spPr>
-        <p:txBody>
-          <a:bodyPr>
-            <a:normAutofit/>
-          </a:bodyPr>
-          <a:lstStyle/>
-          <a:p>
-            <a:pPr marL="342900" indent="-342900">
-              <a:buFont typeface="Arial" charset="0"/>
-              <a:buChar char="•"/>
-            </a:pPr>
-            <a:endParaRPr lang="en-US" dirty="0" smtClean="0"/>
-          </a:p>
-          <a:p>
-            <a:pPr marL="342900" indent="-342900">
-              <a:buFont typeface="Arial" charset="0"/>
-              <a:buChar char="•"/>
-            </a:pPr>
-            <a:endParaRPr lang="en-US" dirty="0"/>
-          </a:p>
-          <a:p>
-            <a:pPr marL="342900" indent="-342900">
-              <a:buFont typeface="Arial" charset="0"/>
-              <a:buChar char="•"/>
-            </a:pPr>
-            <a:endParaRPr lang="en-US" dirty="0" smtClean="0"/>
-          </a:p>
-        </p:txBody>
-      </p:sp>
-      <p:sp>
-        <p:nvSpPr>
-          <p:cNvPr id="8" name="TextBox 7"/>
-          <p:cNvSpPr txBox="1"/>
-          <p:nvPr/>
-        </p:nvSpPr>
-        <p:spPr>
-          <a:xfrm>
-            <a:off x="7818463" y="825910"/>
-            <a:ext cx="3474720" cy="4247317"/>
-          </a:xfrm>
-          <a:prstGeom prst="rect">
-            <a:avLst/>
-          </a:prstGeom>
-          <a:noFill/>
-        </p:spPr>
-        <p:txBody>
-          <a:bodyPr wrap="square" rtlCol="0">
-            <a:spAutoFit/>
-          </a:bodyPr>
-          <a:lstStyle/>
-          <a:p>
-            <a:pPr marL="285750" indent="-285750">
-              <a:buFont typeface="Arial" charset="0"/>
-              <a:buChar char="•"/>
-            </a:pPr>
-            <a:r>
-              <a:rPr lang="en-US" dirty="0" smtClean="0"/>
-              <a:t>51.3% think US is somewhat prepared to prevent cyber attack on agencies.</a:t>
-            </a:r>
-          </a:p>
-          <a:p>
-            <a:pPr marL="285750" indent="-285750">
-              <a:buFont typeface="Arial" charset="0"/>
-              <a:buChar char="•"/>
-            </a:pPr>
-            <a:r>
-              <a:rPr lang="en-US" dirty="0" smtClean="0"/>
-              <a:t>17.6% think we are not too prepared.</a:t>
-            </a:r>
-          </a:p>
-          <a:p>
-            <a:pPr marL="285750" indent="-285750">
-              <a:buFont typeface="Arial" charset="0"/>
-              <a:buChar char="•"/>
-            </a:pPr>
-            <a:r>
-              <a:rPr lang="en-US" dirty="0" smtClean="0"/>
-              <a:t>16.3% think we are very prepared.</a:t>
-            </a:r>
-          </a:p>
-          <a:p>
-            <a:pPr marL="285750" indent="-285750">
-              <a:buFont typeface="Arial" charset="0"/>
-              <a:buChar char="•"/>
-            </a:pPr>
-            <a:endParaRPr lang="en-US" dirty="0"/>
-          </a:p>
-          <a:p>
-            <a:pPr marL="285750" indent="-285750">
-              <a:buFont typeface="Arial" charset="0"/>
-              <a:buChar char="•"/>
-            </a:pPr>
-            <a:endParaRPr lang="en-US" dirty="0" smtClean="0"/>
-          </a:p>
-          <a:p>
-            <a:pPr marL="285750" indent="-285750">
-              <a:buFont typeface="Arial" charset="0"/>
-              <a:buChar char="•"/>
-            </a:pPr>
-            <a:endParaRPr lang="en-US" dirty="0"/>
-          </a:p>
-          <a:p>
-            <a:pPr marL="285750" indent="-285750">
-              <a:buFont typeface="Arial" charset="0"/>
-              <a:buChar char="•"/>
-            </a:pPr>
-            <a:r>
-              <a:rPr lang="en-US" dirty="0" smtClean="0"/>
-              <a:t>46.5% did not hear about </a:t>
-            </a:r>
-            <a:r>
-              <a:rPr lang="en-US" dirty="0" err="1" smtClean="0"/>
-              <a:t>AshleyMadison.com</a:t>
-            </a:r>
-            <a:r>
-              <a:rPr lang="en-US" dirty="0" smtClean="0"/>
-              <a:t> customer info published.</a:t>
-            </a:r>
-          </a:p>
-          <a:p>
-            <a:pPr marL="285750" indent="-285750">
-              <a:buFont typeface="Arial" charset="0"/>
-              <a:buChar char="•"/>
-            </a:pPr>
-            <a:r>
-              <a:rPr lang="en-US" dirty="0" smtClean="0"/>
-              <a:t>26% heard a lot about it.</a:t>
-            </a:r>
-          </a:p>
-          <a:p>
-            <a:pPr marL="285750" indent="-285750">
-              <a:buFont typeface="Arial" charset="0"/>
-              <a:buChar char="•"/>
-            </a:pPr>
-            <a:r>
-              <a:rPr lang="en-US" dirty="0" smtClean="0"/>
-              <a:t>26% heard a little about it.</a:t>
-            </a:r>
-            <a:endParaRPr lang="en-US" dirty="0"/>
-          </a:p>
-        </p:txBody>
-      </p:sp>
-      <p:pic>
-        <p:nvPicPr>
-          <p:cNvPr id="5" name="Content Placeholder 4"/>
-          <p:cNvPicPr>
-            <a:picLocks noGrp="1" noChangeAspect="1"/>
-          </p:cNvPicPr>
-          <p:nvPr>
-            <p:ph sz="quarter" idx="4"/>
-          </p:nvPr>
-        </p:nvPicPr>
-        <p:blipFill>
-          <a:blip r:embed="rId3">
-            <a:extLst>
-              <a:ext uri="{28A0092B-C50C-407E-A947-70E740481C1C}">
-                <a14:useLocalDpi xmlns:a14="http://schemas.microsoft.com/office/drawing/2010/main" val="0"/>
-              </a:ext>
-            </a:extLst>
-          </a:blip>
-          <a:stretch>
-            <a:fillRect/>
-          </a:stretch>
-        </p:blipFill>
-        <p:spPr>
-          <a:xfrm>
-            <a:off x="3771913" y="729472"/>
-            <a:ext cx="3631393" cy="2660044"/>
-          </a:xfrm>
-        </p:spPr>
-      </p:pic>
-      <p:pic>
-        <p:nvPicPr>
-          <p:cNvPr id="6" name="Picture 5"/>
-          <p:cNvPicPr>
-            <a:picLocks noChangeAspect="1"/>
-          </p:cNvPicPr>
-          <p:nvPr/>
-        </p:nvPicPr>
-        <p:blipFill>
-          <a:blip r:embed="rId4">
-            <a:extLst>
-              <a:ext uri="{28A0092B-C50C-407E-A947-70E740481C1C}">
-                <a14:useLocalDpi xmlns:a14="http://schemas.microsoft.com/office/drawing/2010/main" val="0"/>
-              </a:ext>
-            </a:extLst>
-          </a:blip>
-          <a:stretch>
-            <a:fillRect/>
-          </a:stretch>
-        </p:blipFill>
-        <p:spPr>
-          <a:xfrm>
-            <a:off x="3783806" y="3407007"/>
-            <a:ext cx="3619500" cy="2778659"/>
-          </a:xfrm>
-          <a:prstGeom prst="rect">
-            <a:avLst/>
-          </a:prstGeom>
-        </p:spPr>
-      </p:pic>
-    </p:spTree>
-    <p:extLst>
-      <p:ext uri="{BB962C8B-B14F-4D97-AF65-F5344CB8AC3E}">
-        <p14:creationId xmlns:p14="http://schemas.microsoft.com/office/powerpoint/2010/main" val="1165681693"/>
-      </p:ext>
-    </p:extLst>
-  </p:cSld>
-  <p:clrMapOvr>
-    <a:masterClrMapping/>
-  </p:clrMapOvr>
-</p:sld>
-</file>
-
-<file path=ppt/slides/slide37.xml><?xml version="1.0" encoding="utf-8"?>
+<file path=ppt/slides/slide27.xml><?xml version="1.0" encoding="utf-8"?>
 <p:sld xmlns:a="http://schemas.openxmlformats.org/drawingml/2006/main" xmlns:r="http://schemas.openxmlformats.org/officeDocument/2006/relationships" xmlns:p="http://schemas.openxmlformats.org/presentationml/2006/main">
   <p:cSld>
     <p:spTree>
@@ -15443,7 +11687,7 @@
 </p:sld>
 </file>
 
-<file path=ppt/slides/slide38.xml><?xml version="1.0" encoding="utf-8"?>
+<file path=ppt/slides/slide28.xml><?xml version="1.0" encoding="utf-8"?>
 <p:sld xmlns:a="http://schemas.openxmlformats.org/drawingml/2006/main" xmlns:r="http://schemas.openxmlformats.org/officeDocument/2006/relationships" xmlns:p="http://schemas.openxmlformats.org/presentationml/2006/main">
   <p:cSld>
     <p:spTree>
@@ -15519,7 +11763,7 @@
         <p:spPr/>
         <p:txBody>
           <a:bodyPr>
-            <a:normAutofit fontScale="92500" lnSpcReduction="10000"/>
+            <a:normAutofit fontScale="70000" lnSpcReduction="20000"/>
           </a:bodyPr>
           <a:lstStyle/>
           <a:p>
@@ -15545,8 +11789,59 @@
             </a:r>
             <a:r>
               <a:rPr lang="en-US" dirty="0" smtClean="0"/>
-              <a:t>and add Young Boomers if possible.</a:t>
-            </a:r>
+              <a:t>and add Young Boomers if possible</a:t>
+            </a:r>
+            <a:r>
+              <a:rPr lang="en-US" dirty="0" smtClean="0"/>
+              <a:t>. </a:t>
+            </a:r>
+          </a:p>
+          <a:p>
+            <a:pPr lvl="1"/>
+            <a:r>
+              <a:rPr lang="en-US" dirty="0" smtClean="0"/>
+              <a:t>Divorced or Living with a Significant Other</a:t>
+            </a:r>
+          </a:p>
+          <a:p>
+            <a:pPr lvl="1"/>
+            <a:r>
+              <a:rPr lang="en-US" dirty="0" smtClean="0"/>
+              <a:t>Check Internet Multiple Times per Day</a:t>
+            </a:r>
+          </a:p>
+          <a:p>
+            <a:pPr lvl="1"/>
+            <a:r>
+              <a:rPr lang="en-US" dirty="0" smtClean="0"/>
+              <a:t>Between 2 and 3 Persons in Household</a:t>
+            </a:r>
+          </a:p>
+          <a:p>
+            <a:pPr lvl="1"/>
+            <a:r>
+              <a:rPr lang="en-US" dirty="0" smtClean="0"/>
+              <a:t>Use a Variety of Passwords</a:t>
+            </a:r>
+          </a:p>
+          <a:p>
+            <a:pPr lvl="1"/>
+            <a:r>
+              <a:rPr lang="en-US" dirty="0" smtClean="0"/>
+              <a:t>Tend to Not Use Social Media to Access another Website</a:t>
+            </a:r>
+          </a:p>
+          <a:p>
+            <a:pPr lvl="1"/>
+            <a:r>
+              <a:rPr lang="en-US" dirty="0" smtClean="0"/>
+              <a:t>Do not bank online or make purchases while on Public </a:t>
+            </a:r>
+            <a:r>
+              <a:rPr lang="en-US" dirty="0" err="1" smtClean="0"/>
+              <a:t>WiFi</a:t>
+            </a:r>
+            <a:endParaRPr lang="en-US" dirty="0" smtClean="0"/>
           </a:p>
           <a:p>
             <a:r>
@@ -15563,13 +11858,8 @@
           <a:p>
             <a:r>
               <a:rPr lang="en-US" dirty="0" smtClean="0"/>
-              <a:t>Conduct a follow up survey building upon these results, focusing on target age </a:t>
-            </a:r>
-            <a:r>
-              <a:rPr lang="en-US" dirty="0" smtClean="0"/>
-              <a:t>groups based upon responses for this survey.</a:t>
-            </a:r>
-            <a:endParaRPr lang="en-US" dirty="0" smtClean="0"/>
+              <a:t>Conduct a follow up survey building upon these results, focusing on target age groups based upon responses for this survey.</a:t>
+            </a:r>
           </a:p>
           <a:p>
             <a:r>
@@ -15595,13 +11885,8 @@
             <a:pPr lvl="1"/>
             <a:r>
               <a:rPr lang="en-US" dirty="0" smtClean="0"/>
-              <a:t>More quantitative data would be helpful for </a:t>
-            </a:r>
-            <a:r>
-              <a:rPr lang="en-US" dirty="0" smtClean="0"/>
-              <a:t>more detailed analysis.</a:t>
-            </a:r>
-            <a:endParaRPr lang="en-US" dirty="0" smtClean="0"/>
+              <a:t>More quantitative data would be helpful for more detailed analysis.</a:t>
+            </a:r>
           </a:p>
           <a:p>
             <a:pPr lvl="1"/>
@@ -15621,25 +11906,15 @@
             <a:pPr lvl="1"/>
             <a:r>
               <a:rPr lang="en-US" dirty="0" smtClean="0"/>
-              <a:t>Include questions covering options that responders/ customers </a:t>
-            </a:r>
+              <a:t>Include questions covering options that responders/ customers want, which was not included in this survey.</a:t>
+            </a:r>
+          </a:p>
+          <a:p>
+            <a:pPr lvl="1"/>
             <a:r>
               <a:rPr lang="en-US" dirty="0" smtClean="0"/>
-              <a:t>want, which was not included in this survey.</a:t>
-            </a:r>
-            <a:endParaRPr lang="en-US" dirty="0" smtClean="0"/>
-          </a:p>
-          <a:p>
-            <a:pPr lvl="1"/>
-            <a:r>
-              <a:rPr lang="en-US" dirty="0" smtClean="0"/>
-              <a:t>Include operating system </a:t>
-            </a:r>
-            <a:r>
-              <a:rPr lang="en-US" dirty="0" smtClean="0"/>
-              <a:t>questions to help with the app design.</a:t>
-            </a:r>
-            <a:endParaRPr lang="en-US" dirty="0" smtClean="0"/>
+              <a:t>Include operating system questions to help with the app design.</a:t>
+            </a:r>
           </a:p>
           <a:p>
             <a:pPr lvl="1"/>
@@ -15651,6 +11926,108 @@
     <p:extLst>
       <p:ext uri="{BB962C8B-B14F-4D97-AF65-F5344CB8AC3E}">
         <p14:creationId xmlns:p14="http://schemas.microsoft.com/office/powerpoint/2010/main" val="780701252"/>
+      </p:ext>
+    </p:extLst>
+  </p:cSld>
+  <p:clrMapOvr>
+    <a:masterClrMapping/>
+  </p:clrMapOvr>
+</p:sld>
+</file>
+
+<file path=ppt/slides/slide3.xml><?xml version="1.0" encoding="utf-8"?>
+<p:sld xmlns:a="http://schemas.openxmlformats.org/drawingml/2006/main" xmlns:r="http://schemas.openxmlformats.org/officeDocument/2006/relationships" xmlns:p="http://schemas.openxmlformats.org/presentationml/2006/main">
+  <p:cSld>
+    <p:spTree>
+      <p:nvGrpSpPr>
+        <p:cNvPr id="1" name=""/>
+        <p:cNvGrpSpPr/>
+        <p:nvPr/>
+      </p:nvGrpSpPr>
+      <p:grpSpPr>
+        <a:xfrm>
+          <a:off x="0" y="0"/>
+          <a:ext cx="0" cy="0"/>
+          <a:chOff x="0" y="0"/>
+          <a:chExt cx="0" cy="0"/>
+        </a:xfrm>
+      </p:grpSpPr>
+      <p:sp>
+        <p:nvSpPr>
+          <p:cNvPr id="2" name="Title 1"/>
+          <p:cNvSpPr>
+            <a:spLocks noGrp="1"/>
+          </p:cNvSpPr>
+          <p:nvPr>
+            <p:ph type="title"/>
+          </p:nvPr>
+        </p:nvSpPr>
+        <p:spPr/>
+        <p:txBody>
+          <a:bodyPr/>
+          <a:lstStyle/>
+          <a:p>
+            <a:r>
+              <a:rPr lang="en-US" dirty="0" smtClean="0"/>
+              <a:t>Data Issues</a:t>
+            </a:r>
+            <a:endParaRPr lang="en-US" dirty="0"/>
+          </a:p>
+        </p:txBody>
+      </p:sp>
+      <p:sp>
+        <p:nvSpPr>
+          <p:cNvPr id="3" name="Content Placeholder 2"/>
+          <p:cNvSpPr>
+            <a:spLocks noGrp="1"/>
+          </p:cNvSpPr>
+          <p:nvPr>
+            <p:ph idx="1"/>
+          </p:nvPr>
+        </p:nvSpPr>
+        <p:spPr/>
+        <p:txBody>
+          <a:bodyPr/>
+          <a:lstStyle/>
+          <a:p>
+            <a:r>
+              <a:rPr lang="en-US" dirty="0" smtClean="0"/>
+              <a:t>Many Non-Response, NA and Don’t Know responses in the majority of the 105 variables.</a:t>
+            </a:r>
+          </a:p>
+          <a:p>
+            <a:r>
+              <a:rPr lang="en-US" dirty="0" smtClean="0"/>
+              <a:t>105 Variables and 1,040 observations made initial investigation bulky.</a:t>
+            </a:r>
+          </a:p>
+          <a:p>
+            <a:r>
+              <a:rPr lang="en-US" dirty="0" smtClean="0"/>
+              <a:t>Survey data is very interesting, but the limited quantity of numerical and time-related variables reduced types of analytical methods that I wanted to learn.</a:t>
+            </a:r>
+          </a:p>
+          <a:p>
+            <a:r>
+              <a:rPr lang="en-US" dirty="0" smtClean="0"/>
+              <a:t>After several attempts to set up a model, I decided to use the age (</a:t>
+            </a:r>
+            <a:r>
+              <a:rPr lang="en-US" dirty="0" err="1" smtClean="0"/>
+              <a:t>agegroup</a:t>
+            </a:r>
+            <a:r>
+              <a:rPr lang="en-US" dirty="0" smtClean="0"/>
+              <a:t>) as the base variable since it was answered by almost everyone surveyed. </a:t>
+            </a:r>
+            <a:endParaRPr lang="en-US" dirty="0"/>
+          </a:p>
+        </p:txBody>
+      </p:sp>
+    </p:spTree>
+    <p:extLst>
+      <p:ext uri="{BB962C8B-B14F-4D97-AF65-F5344CB8AC3E}">
+        <p14:creationId xmlns:p14="http://schemas.microsoft.com/office/powerpoint/2010/main" val="501460571"/>
       </p:ext>
     </p:extLst>
   </p:cSld>

</xml_diff>